<commit_message>
docs: JOSS manuscript drafted
</commit_message>
<xml_diff>
--- a/paper/figures.pptx
+++ b/paper/figures.pptx
@@ -6,6 +6,16 @@
   </p:sldMasterIdLst>
   <p:sldIdLst>
     <p:sldId id="256" r:id="rId2"/>
+    <p:sldId id="257" r:id="rId3"/>
+    <p:sldId id="258" r:id="rId4"/>
+    <p:sldId id="259" r:id="rId5"/>
+    <p:sldId id="260" r:id="rId6"/>
+    <p:sldId id="265" r:id="rId7"/>
+    <p:sldId id="266" r:id="rId8"/>
+    <p:sldId id="262" r:id="rId9"/>
+    <p:sldId id="261" r:id="rId10"/>
+    <p:sldId id="264" r:id="rId11"/>
+    <p:sldId id="263" r:id="rId12"/>
   </p:sldIdLst>
   <p:sldSz cx="9906000" cy="6858000" type="A4"/>
   <p:notesSz cx="6858000" cy="9144000"/>
@@ -104,6 +114,11 @@
       </a:defRPr>
     </a:lvl9pPr>
   </p:defaultTextStyle>
+  <p:extLst>
+    <p:ext uri="{EFAFB233-063F-42B5-8137-9DF3F51BA10A}">
+      <p15:sldGuideLst xmlns:p15="http://schemas.microsoft.com/office/powerpoint/2012/main"/>
+    </p:ext>
+  </p:extLst>
 </p:presentation>
 </file>
 
@@ -238,7 +253,7 @@
           <a:p>
             <a:fld id="{00E6BC69-8B7C-9449-ADE9-E0CFA87DD060}" type="datetimeFigureOut">
               <a:rPr lang="en-US" smtClean="0"/>
-              <a:t>7/8/24</a:t>
+              <a:t>11/20/24</a:t>
             </a:fld>
             <a:endParaRPr lang="en-US"/>
           </a:p>
@@ -408,7 +423,7 @@
           <a:p>
             <a:fld id="{00E6BC69-8B7C-9449-ADE9-E0CFA87DD060}" type="datetimeFigureOut">
               <a:rPr lang="en-US" smtClean="0"/>
-              <a:t>7/8/24</a:t>
+              <a:t>11/20/24</a:t>
             </a:fld>
             <a:endParaRPr lang="en-US"/>
           </a:p>
@@ -588,7 +603,7 @@
           <a:p>
             <a:fld id="{00E6BC69-8B7C-9449-ADE9-E0CFA87DD060}" type="datetimeFigureOut">
               <a:rPr lang="en-US" smtClean="0"/>
-              <a:t>7/8/24</a:t>
+              <a:t>11/20/24</a:t>
             </a:fld>
             <a:endParaRPr lang="en-US"/>
           </a:p>
@@ -758,7 +773,7 @@
           <a:p>
             <a:fld id="{00E6BC69-8B7C-9449-ADE9-E0CFA87DD060}" type="datetimeFigureOut">
               <a:rPr lang="en-US" smtClean="0"/>
-              <a:t>7/8/24</a:t>
+              <a:t>11/20/24</a:t>
             </a:fld>
             <a:endParaRPr lang="en-US"/>
           </a:p>
@@ -1004,7 +1019,7 @@
           <a:p>
             <a:fld id="{00E6BC69-8B7C-9449-ADE9-E0CFA87DD060}" type="datetimeFigureOut">
               <a:rPr lang="en-US" smtClean="0"/>
-              <a:t>7/8/24</a:t>
+              <a:t>11/20/24</a:t>
             </a:fld>
             <a:endParaRPr lang="en-US"/>
           </a:p>
@@ -1236,7 +1251,7 @@
           <a:p>
             <a:fld id="{00E6BC69-8B7C-9449-ADE9-E0CFA87DD060}" type="datetimeFigureOut">
               <a:rPr lang="en-US" smtClean="0"/>
-              <a:t>7/8/24</a:t>
+              <a:t>11/20/24</a:t>
             </a:fld>
             <a:endParaRPr lang="en-US"/>
           </a:p>
@@ -1603,7 +1618,7 @@
           <a:p>
             <a:fld id="{00E6BC69-8B7C-9449-ADE9-E0CFA87DD060}" type="datetimeFigureOut">
               <a:rPr lang="en-US" smtClean="0"/>
-              <a:t>7/8/24</a:t>
+              <a:t>11/20/24</a:t>
             </a:fld>
             <a:endParaRPr lang="en-US"/>
           </a:p>
@@ -1721,7 +1736,7 @@
           <a:p>
             <a:fld id="{00E6BC69-8B7C-9449-ADE9-E0CFA87DD060}" type="datetimeFigureOut">
               <a:rPr lang="en-US" smtClean="0"/>
-              <a:t>7/8/24</a:t>
+              <a:t>11/20/24</a:t>
             </a:fld>
             <a:endParaRPr lang="en-US"/>
           </a:p>
@@ -1816,7 +1831,7 @@
           <a:p>
             <a:fld id="{00E6BC69-8B7C-9449-ADE9-E0CFA87DD060}" type="datetimeFigureOut">
               <a:rPr lang="en-US" smtClean="0"/>
-              <a:t>7/8/24</a:t>
+              <a:t>11/20/24</a:t>
             </a:fld>
             <a:endParaRPr lang="en-US"/>
           </a:p>
@@ -2093,7 +2108,7 @@
           <a:p>
             <a:fld id="{00E6BC69-8B7C-9449-ADE9-E0CFA87DD060}" type="datetimeFigureOut">
               <a:rPr lang="en-US" smtClean="0"/>
-              <a:t>7/8/24</a:t>
+              <a:t>11/20/24</a:t>
             </a:fld>
             <a:endParaRPr lang="en-US"/>
           </a:p>
@@ -2350,7 +2365,7 @@
           <a:p>
             <a:fld id="{00E6BC69-8B7C-9449-ADE9-E0CFA87DD060}" type="datetimeFigureOut">
               <a:rPr lang="en-US" smtClean="0"/>
-              <a:t>7/8/24</a:t>
+              <a:t>11/20/24</a:t>
             </a:fld>
             <a:endParaRPr lang="en-US"/>
           </a:p>
@@ -2563,7 +2578,7 @@
           <a:p>
             <a:fld id="{00E6BC69-8B7C-9449-ADE9-E0CFA87DD060}" type="datetimeFigureOut">
               <a:rPr lang="en-US" smtClean="0"/>
-              <a:t>7/8/24</a:t>
+              <a:t>11/20/24</a:t>
             </a:fld>
             <a:endParaRPr lang="en-US"/>
           </a:p>
@@ -11073,7 +11088,7 @@
         </p:nvGrpSpPr>
         <p:grpSpPr>
           <a:xfrm>
-            <a:off x="-1542238" y="4495639"/>
+            <a:off x="-1542238" y="6354357"/>
             <a:ext cx="4491002" cy="3621224"/>
             <a:chOff x="-1221659" y="4123157"/>
             <a:chExt cx="4491002" cy="3621224"/>
@@ -13526,6 +13541,4476 @@
 </p:sld>
 </file>
 
+<file path=ppt/slides/slide10.xml><?xml version="1.0" encoding="utf-8"?>
+<p:sld xmlns:a="http://schemas.openxmlformats.org/drawingml/2006/main" xmlns:r="http://schemas.openxmlformats.org/officeDocument/2006/relationships" xmlns:p="http://schemas.openxmlformats.org/presentationml/2006/main">
+  <p:cSld>
+    <p:spTree>
+      <p:nvGrpSpPr>
+        <p:cNvPr id="1" name=""/>
+        <p:cNvGrpSpPr/>
+        <p:nvPr/>
+      </p:nvGrpSpPr>
+      <p:grpSpPr>
+        <a:xfrm>
+          <a:off x="0" y="0"/>
+          <a:ext cx="0" cy="0"/>
+          <a:chOff x="0" y="0"/>
+          <a:chExt cx="0" cy="0"/>
+        </a:xfrm>
+      </p:grpSpPr>
+      <p:sp>
+        <p:nvSpPr>
+          <p:cNvPr id="2" name="Title 1">
+            <a:extLst>
+              <a:ext uri="{FF2B5EF4-FFF2-40B4-BE49-F238E27FC236}">
+                <a16:creationId xmlns:a16="http://schemas.microsoft.com/office/drawing/2014/main" id="{DD5FE79A-18FA-539C-D3EB-EE2F7C832C6A}"/>
+              </a:ext>
+            </a:extLst>
+          </p:cNvPr>
+          <p:cNvSpPr>
+            <a:spLocks noGrp="1"/>
+          </p:cNvSpPr>
+          <p:nvPr>
+            <p:ph type="title"/>
+          </p:nvPr>
+        </p:nvSpPr>
+        <p:spPr/>
+        <p:txBody>
+          <a:bodyPr/>
+          <a:lstStyle/>
+          <a:p>
+            <a:endParaRPr lang="en-US" dirty="0"/>
+          </a:p>
+        </p:txBody>
+      </p:sp>
+      <p:sp>
+        <p:nvSpPr>
+          <p:cNvPr id="3" name="Content Placeholder 2">
+            <a:extLst>
+              <a:ext uri="{FF2B5EF4-FFF2-40B4-BE49-F238E27FC236}">
+                <a16:creationId xmlns:a16="http://schemas.microsoft.com/office/drawing/2014/main" id="{3A139FD5-25CD-04CC-14E2-5CBB78CF90D0}"/>
+              </a:ext>
+            </a:extLst>
+          </p:cNvPr>
+          <p:cNvSpPr>
+            <a:spLocks noGrp="1"/>
+          </p:cNvSpPr>
+          <p:nvPr>
+            <p:ph idx="1"/>
+          </p:nvPr>
+        </p:nvSpPr>
+        <p:spPr/>
+        <p:txBody>
+          <a:bodyPr/>
+          <a:lstStyle/>
+          <a:p>
+            <a:endParaRPr lang="en-US"/>
+          </a:p>
+        </p:txBody>
+      </p:sp>
+    </p:spTree>
+    <p:extLst>
+      <p:ext uri="{BB962C8B-B14F-4D97-AF65-F5344CB8AC3E}">
+        <p14:creationId xmlns:p14="http://schemas.microsoft.com/office/powerpoint/2010/main" val="94261749"/>
+      </p:ext>
+    </p:extLst>
+  </p:cSld>
+  <p:clrMapOvr>
+    <a:masterClrMapping/>
+  </p:clrMapOvr>
+</p:sld>
+</file>
+
+<file path=ppt/slides/slide11.xml><?xml version="1.0" encoding="utf-8"?>
+<p:sld xmlns:a="http://schemas.openxmlformats.org/drawingml/2006/main" xmlns:r="http://schemas.openxmlformats.org/officeDocument/2006/relationships" xmlns:p="http://schemas.openxmlformats.org/presentationml/2006/main">
+  <p:cSld>
+    <p:spTree>
+      <p:nvGrpSpPr>
+        <p:cNvPr id="1" name=""/>
+        <p:cNvGrpSpPr/>
+        <p:nvPr/>
+      </p:nvGrpSpPr>
+      <p:grpSpPr>
+        <a:xfrm>
+          <a:off x="0" y="0"/>
+          <a:ext cx="0" cy="0"/>
+          <a:chOff x="0" y="0"/>
+          <a:chExt cx="0" cy="0"/>
+        </a:xfrm>
+      </p:grpSpPr>
+      <p:sp>
+        <p:nvSpPr>
+          <p:cNvPr id="3" name="Content Placeholder 2">
+            <a:extLst>
+              <a:ext uri="{FF2B5EF4-FFF2-40B4-BE49-F238E27FC236}">
+                <a16:creationId xmlns:a16="http://schemas.microsoft.com/office/drawing/2014/main" id="{4D6620A3-47D2-B268-DC0C-E737CA7B7F8B}"/>
+              </a:ext>
+            </a:extLst>
+          </p:cNvPr>
+          <p:cNvSpPr>
+            <a:spLocks noGrp="1"/>
+          </p:cNvSpPr>
+          <p:nvPr>
+            <p:ph idx="1"/>
+          </p:nvPr>
+        </p:nvSpPr>
+        <p:spPr/>
+        <p:txBody>
+          <a:bodyPr/>
+          <a:lstStyle/>
+          <a:p>
+            <a:pPr marL="514350" indent="-514350">
+              <a:buAutoNum type="arabicPeriod"/>
+            </a:pPr>
+            <a:r>
+              <a:rPr lang="en-US" dirty="0"/>
+              <a:t>Automatic plot type selection based on relationships.</a:t>
+            </a:r>
+          </a:p>
+          <a:p>
+            <a:pPr marL="514350" indent="-514350">
+              <a:buAutoNum type="arabicPeriod"/>
+            </a:pPr>
+            <a:r>
+              <a:rPr lang="en-US" dirty="0"/>
+              <a:t>Single Function</a:t>
+            </a:r>
+          </a:p>
+          <a:p>
+            <a:pPr marL="514350" indent="-514350">
+              <a:buAutoNum type="arabicPeriod"/>
+            </a:pPr>
+            <a:r>
+              <a:rPr lang="en-US" dirty="0"/>
+              <a:t>Interactive</a:t>
+            </a:r>
+          </a:p>
+        </p:txBody>
+      </p:sp>
+      <p:sp>
+        <p:nvSpPr>
+          <p:cNvPr id="5" name="Title 4">
+            <a:extLst>
+              <a:ext uri="{FF2B5EF4-FFF2-40B4-BE49-F238E27FC236}">
+                <a16:creationId xmlns:a16="http://schemas.microsoft.com/office/drawing/2014/main" id="{5DBA8C76-7415-AC5A-2BCB-646637D7421F}"/>
+              </a:ext>
+            </a:extLst>
+          </p:cNvPr>
+          <p:cNvSpPr>
+            <a:spLocks noGrp="1"/>
+          </p:cNvSpPr>
+          <p:nvPr>
+            <p:ph type="title"/>
+          </p:nvPr>
+        </p:nvSpPr>
+        <p:spPr/>
+        <p:txBody>
+          <a:bodyPr/>
+          <a:lstStyle/>
+          <a:p>
+            <a:r>
+              <a:rPr lang="en-US" dirty="0"/>
+              <a:t>Features</a:t>
+            </a:r>
+          </a:p>
+        </p:txBody>
+      </p:sp>
+    </p:spTree>
+    <p:extLst>
+      <p:ext uri="{BB962C8B-B14F-4D97-AF65-F5344CB8AC3E}">
+        <p14:creationId xmlns:p14="http://schemas.microsoft.com/office/powerpoint/2010/main" val="2564494998"/>
+      </p:ext>
+    </p:extLst>
+  </p:cSld>
+  <p:clrMapOvr>
+    <a:masterClrMapping/>
+  </p:clrMapOvr>
+</p:sld>
+</file>
+
+<file path=ppt/slides/slide2.xml><?xml version="1.0" encoding="utf-8"?>
+<p:sld xmlns:a="http://schemas.openxmlformats.org/drawingml/2006/main" xmlns:r="http://schemas.openxmlformats.org/officeDocument/2006/relationships" xmlns:p="http://schemas.openxmlformats.org/presentationml/2006/main">
+  <p:cSld>
+    <p:spTree>
+      <p:nvGrpSpPr>
+        <p:cNvPr id="1" name=""/>
+        <p:cNvGrpSpPr/>
+        <p:nvPr/>
+      </p:nvGrpSpPr>
+      <p:grpSpPr>
+        <a:xfrm>
+          <a:off x="0" y="0"/>
+          <a:ext cx="0" cy="0"/>
+          <a:chOff x="0" y="0"/>
+          <a:chExt cx="0" cy="0"/>
+        </a:xfrm>
+      </p:grpSpPr>
+      <p:pic>
+        <p:nvPicPr>
+          <p:cNvPr id="4" name="Picture 3">
+            <a:extLst>
+              <a:ext uri="{FF2B5EF4-FFF2-40B4-BE49-F238E27FC236}">
+                <a16:creationId xmlns:a16="http://schemas.microsoft.com/office/drawing/2014/main" id="{553374F0-398F-86CB-2C1D-9375A33C7BD5}"/>
+              </a:ext>
+            </a:extLst>
+          </p:cNvPr>
+          <p:cNvPicPr>
+            <a:picLocks noChangeAspect="1"/>
+          </p:cNvPicPr>
+          <p:nvPr/>
+        </p:nvPicPr>
+        <p:blipFill>
+          <a:blip r:embed="rId2"/>
+          <a:stretch>
+            <a:fillRect/>
+          </a:stretch>
+        </p:blipFill>
+        <p:spPr>
+          <a:xfrm>
+            <a:off x="1066800" y="3441821"/>
+            <a:ext cx="7772400" cy="1853668"/>
+          </a:xfrm>
+          <a:prstGeom prst="rect">
+            <a:avLst/>
+          </a:prstGeom>
+        </p:spPr>
+      </p:pic>
+      <p:pic>
+        <p:nvPicPr>
+          <p:cNvPr id="5" name="Picture 4">
+            <a:extLst>
+              <a:ext uri="{FF2B5EF4-FFF2-40B4-BE49-F238E27FC236}">
+                <a16:creationId xmlns:a16="http://schemas.microsoft.com/office/drawing/2014/main" id="{5028BFFF-316E-D4FF-15E8-201501513CDE}"/>
+              </a:ext>
+            </a:extLst>
+          </p:cNvPr>
+          <p:cNvPicPr>
+            <a:picLocks noChangeAspect="1"/>
+          </p:cNvPicPr>
+          <p:nvPr/>
+        </p:nvPicPr>
+        <p:blipFill>
+          <a:blip r:embed="rId3"/>
+          <a:stretch>
+            <a:fillRect/>
+          </a:stretch>
+        </p:blipFill>
+        <p:spPr>
+          <a:xfrm>
+            <a:off x="1066800" y="5766969"/>
+            <a:ext cx="7772400" cy="2513954"/>
+          </a:xfrm>
+          <a:prstGeom prst="rect">
+            <a:avLst/>
+          </a:prstGeom>
+        </p:spPr>
+      </p:pic>
+      <p:pic>
+        <p:nvPicPr>
+          <p:cNvPr id="6" name="Picture 5">
+            <a:extLst>
+              <a:ext uri="{FF2B5EF4-FFF2-40B4-BE49-F238E27FC236}">
+                <a16:creationId xmlns:a16="http://schemas.microsoft.com/office/drawing/2014/main" id="{0ACD3797-C814-7914-3396-E1FF08C30916}"/>
+              </a:ext>
+            </a:extLst>
+          </p:cNvPr>
+          <p:cNvPicPr>
+            <a:picLocks noChangeAspect="1"/>
+          </p:cNvPicPr>
+          <p:nvPr/>
+        </p:nvPicPr>
+        <p:blipFill>
+          <a:blip r:embed="rId4"/>
+          <a:stretch>
+            <a:fillRect/>
+          </a:stretch>
+        </p:blipFill>
+        <p:spPr>
+          <a:xfrm>
+            <a:off x="1066800" y="-1310112"/>
+            <a:ext cx="7772400" cy="4166870"/>
+          </a:xfrm>
+          <a:prstGeom prst="rect">
+            <a:avLst/>
+          </a:prstGeom>
+        </p:spPr>
+      </p:pic>
+      <p:sp>
+        <p:nvSpPr>
+          <p:cNvPr id="7" name="TextBox 6">
+            <a:extLst>
+              <a:ext uri="{FF2B5EF4-FFF2-40B4-BE49-F238E27FC236}">
+                <a16:creationId xmlns:a16="http://schemas.microsoft.com/office/drawing/2014/main" id="{6DCD05BD-FD16-0E95-2AFD-9F7B61DA999F}"/>
+              </a:ext>
+            </a:extLst>
+          </p:cNvPr>
+          <p:cNvSpPr txBox="1"/>
+          <p:nvPr/>
+        </p:nvSpPr>
+        <p:spPr>
+          <a:xfrm>
+            <a:off x="4648269" y="-1691059"/>
+            <a:ext cx="609462" cy="369332"/>
+          </a:xfrm>
+          <a:prstGeom prst="rect">
+            <a:avLst/>
+          </a:prstGeom>
+          <a:noFill/>
+        </p:spPr>
+        <p:txBody>
+          <a:bodyPr wrap="none" rtlCol="0">
+            <a:spAutoFit/>
+          </a:bodyPr>
+          <a:lstStyle/>
+          <a:p>
+            <a:r>
+              <a:rPr lang="en-US" b="1" dirty="0">
+                <a:latin typeface="Roboto" panose="02000000000000000000" pitchFamily="2" charset="0"/>
+                <a:ea typeface="Roboto" panose="02000000000000000000" pitchFamily="2" charset="0"/>
+              </a:rPr>
+              <a:t>IRIS</a:t>
+            </a:r>
+          </a:p>
+        </p:txBody>
+      </p:sp>
+      <p:sp>
+        <p:nvSpPr>
+          <p:cNvPr id="9" name="TextBox 8">
+            <a:extLst>
+              <a:ext uri="{FF2B5EF4-FFF2-40B4-BE49-F238E27FC236}">
+                <a16:creationId xmlns:a16="http://schemas.microsoft.com/office/drawing/2014/main" id="{36D55687-FDB7-CEEE-A18F-A0EDB92B59E7}"/>
+              </a:ext>
+            </a:extLst>
+          </p:cNvPr>
+          <p:cNvSpPr txBox="1"/>
+          <p:nvPr/>
+        </p:nvSpPr>
+        <p:spPr>
+          <a:xfrm>
+            <a:off x="3555021" y="3197005"/>
+            <a:ext cx="2795958" cy="369332"/>
+          </a:xfrm>
+          <a:prstGeom prst="rect">
+            <a:avLst/>
+          </a:prstGeom>
+          <a:noFill/>
+        </p:spPr>
+        <p:txBody>
+          <a:bodyPr wrap="none" rtlCol="0">
+            <a:spAutoFit/>
+          </a:bodyPr>
+          <a:lstStyle/>
+          <a:p>
+            <a:pPr algn="ctr"/>
+            <a:r>
+              <a:rPr lang="en-US" b="1" dirty="0">
+                <a:latin typeface="Roboto" panose="02000000000000000000" pitchFamily="2" charset="0"/>
+                <a:ea typeface="Roboto" panose="02000000000000000000" pitchFamily="2" charset="0"/>
+              </a:rPr>
+              <a:t>Chicken Weights by Feed</a:t>
+            </a:r>
+          </a:p>
+        </p:txBody>
+      </p:sp>
+      <p:sp>
+        <p:nvSpPr>
+          <p:cNvPr id="10" name="TextBox 9">
+            <a:extLst>
+              <a:ext uri="{FF2B5EF4-FFF2-40B4-BE49-F238E27FC236}">
+                <a16:creationId xmlns:a16="http://schemas.microsoft.com/office/drawing/2014/main" id="{680B4203-4AD0-AB3A-3870-4F2E845B972C}"/>
+              </a:ext>
+            </a:extLst>
+          </p:cNvPr>
+          <p:cNvSpPr txBox="1"/>
+          <p:nvPr/>
+        </p:nvSpPr>
+        <p:spPr>
+          <a:xfrm>
+            <a:off x="4502397" y="5402968"/>
+            <a:ext cx="901209" cy="369332"/>
+          </a:xfrm>
+          <a:prstGeom prst="rect">
+            <a:avLst/>
+          </a:prstGeom>
+          <a:noFill/>
+        </p:spPr>
+        <p:txBody>
+          <a:bodyPr wrap="none" rtlCol="0">
+            <a:spAutoFit/>
+          </a:bodyPr>
+          <a:lstStyle/>
+          <a:p>
+            <a:pPr algn="ctr"/>
+            <a:r>
+              <a:rPr lang="en-US" b="1" dirty="0">
+                <a:latin typeface="Roboto" panose="02000000000000000000" pitchFamily="2" charset="0"/>
+                <a:ea typeface="Roboto" panose="02000000000000000000" pitchFamily="2" charset="0"/>
+              </a:rPr>
+              <a:t>Titanic</a:t>
+            </a:r>
+          </a:p>
+        </p:txBody>
+      </p:sp>
+      <p:pic>
+        <p:nvPicPr>
+          <p:cNvPr id="11" name="Picture 10">
+            <a:extLst>
+              <a:ext uri="{FF2B5EF4-FFF2-40B4-BE49-F238E27FC236}">
+                <a16:creationId xmlns:a16="http://schemas.microsoft.com/office/drawing/2014/main" id="{A2A6BDDF-1E62-37FE-626B-8A085A3B55C4}"/>
+              </a:ext>
+            </a:extLst>
+          </p:cNvPr>
+          <p:cNvPicPr>
+            <a:picLocks noChangeAspect="1"/>
+          </p:cNvPicPr>
+          <p:nvPr/>
+        </p:nvPicPr>
+        <p:blipFill>
+          <a:blip r:embed="rId5"/>
+          <a:stretch>
+            <a:fillRect/>
+          </a:stretch>
+        </p:blipFill>
+        <p:spPr>
+          <a:xfrm>
+            <a:off x="1066800" y="8817451"/>
+            <a:ext cx="7772400" cy="2626467"/>
+          </a:xfrm>
+          <a:prstGeom prst="rect">
+            <a:avLst/>
+          </a:prstGeom>
+        </p:spPr>
+      </p:pic>
+      <p:sp>
+        <p:nvSpPr>
+          <p:cNvPr id="12" name="TextBox 11">
+            <a:extLst>
+              <a:ext uri="{FF2B5EF4-FFF2-40B4-BE49-F238E27FC236}">
+                <a16:creationId xmlns:a16="http://schemas.microsoft.com/office/drawing/2014/main" id="{75EEE28A-3E0B-4A58-D34F-84C714326929}"/>
+              </a:ext>
+            </a:extLst>
+          </p:cNvPr>
+          <p:cNvSpPr txBox="1"/>
+          <p:nvPr/>
+        </p:nvSpPr>
+        <p:spPr>
+          <a:xfrm>
+            <a:off x="3963789" y="9092126"/>
+            <a:ext cx="1978427" cy="369332"/>
+          </a:xfrm>
+          <a:prstGeom prst="rect">
+            <a:avLst/>
+          </a:prstGeom>
+          <a:noFill/>
+        </p:spPr>
+        <p:txBody>
+          <a:bodyPr wrap="none" rtlCol="0">
+            <a:spAutoFit/>
+          </a:bodyPr>
+          <a:lstStyle/>
+          <a:p>
+            <a:pPr algn="ctr"/>
+            <a:r>
+              <a:rPr lang="en-US" b="1" dirty="0">
+                <a:latin typeface="Roboto" panose="02000000000000000000" pitchFamily="2" charset="0"/>
+                <a:ea typeface="Roboto" panose="02000000000000000000" pitchFamily="2" charset="0"/>
+              </a:rPr>
+              <a:t>Lazy Birdwatcher</a:t>
+            </a:r>
+          </a:p>
+        </p:txBody>
+      </p:sp>
+    </p:spTree>
+    <p:extLst>
+      <p:ext uri="{BB962C8B-B14F-4D97-AF65-F5344CB8AC3E}">
+        <p14:creationId xmlns:p14="http://schemas.microsoft.com/office/powerpoint/2010/main" val="3691435195"/>
+      </p:ext>
+    </p:extLst>
+  </p:cSld>
+  <p:clrMapOvr>
+    <a:masterClrMapping/>
+  </p:clrMapOvr>
+</p:sld>
+</file>
+
+<file path=ppt/slides/slide3.xml><?xml version="1.0" encoding="utf-8"?>
+<p:sld xmlns:a="http://schemas.openxmlformats.org/drawingml/2006/main" xmlns:r="http://schemas.openxmlformats.org/officeDocument/2006/relationships" xmlns:p="http://schemas.openxmlformats.org/presentationml/2006/main">
+  <p:cSld>
+    <p:spTree>
+      <p:nvGrpSpPr>
+        <p:cNvPr id="1" name="">
+          <a:extLst>
+            <a:ext uri="{FF2B5EF4-FFF2-40B4-BE49-F238E27FC236}">
+              <a16:creationId xmlns:a16="http://schemas.microsoft.com/office/drawing/2014/main" id="{4888011D-F476-6F2D-12F7-7E68F3F9E70F}"/>
+            </a:ext>
+          </a:extLst>
+        </p:cNvPr>
+        <p:cNvGrpSpPr/>
+        <p:nvPr/>
+      </p:nvGrpSpPr>
+      <p:grpSpPr>
+        <a:xfrm>
+          <a:off x="0" y="0"/>
+          <a:ext cx="0" cy="0"/>
+          <a:chOff x="0" y="0"/>
+          <a:chExt cx="0" cy="0"/>
+        </a:xfrm>
+      </p:grpSpPr>
+      <p:sp>
+        <p:nvSpPr>
+          <p:cNvPr id="7" name="TextBox 6">
+            <a:extLst>
+              <a:ext uri="{FF2B5EF4-FFF2-40B4-BE49-F238E27FC236}">
+                <a16:creationId xmlns:a16="http://schemas.microsoft.com/office/drawing/2014/main" id="{921B1AC8-2AFB-B5AF-D794-E5812356AD1A}"/>
+              </a:ext>
+            </a:extLst>
+          </p:cNvPr>
+          <p:cNvSpPr txBox="1"/>
+          <p:nvPr/>
+        </p:nvSpPr>
+        <p:spPr>
+          <a:xfrm>
+            <a:off x="4648269" y="-1294373"/>
+            <a:ext cx="1034257" cy="369332"/>
+          </a:xfrm>
+          <a:prstGeom prst="rect">
+            <a:avLst/>
+          </a:prstGeom>
+          <a:noFill/>
+        </p:spPr>
+        <p:txBody>
+          <a:bodyPr wrap="none" rtlCol="0">
+            <a:spAutoFit/>
+          </a:bodyPr>
+          <a:lstStyle/>
+          <a:p>
+            <a:r>
+              <a:rPr lang="en-US" b="1" dirty="0">
+                <a:latin typeface="Roboto" panose="02000000000000000000" pitchFamily="2" charset="0"/>
+                <a:ea typeface="Roboto" panose="02000000000000000000" pitchFamily="2" charset="0"/>
+              </a:rPr>
+              <a:t>Figure 1</a:t>
+            </a:r>
+          </a:p>
+        </p:txBody>
+      </p:sp>
+      <p:grpSp>
+        <p:nvGrpSpPr>
+          <p:cNvPr id="14" name="Group 13">
+            <a:extLst>
+              <a:ext uri="{FF2B5EF4-FFF2-40B4-BE49-F238E27FC236}">
+                <a16:creationId xmlns:a16="http://schemas.microsoft.com/office/drawing/2014/main" id="{46557E18-E8E6-76CA-8050-826C5A32C72F}"/>
+              </a:ext>
+            </a:extLst>
+          </p:cNvPr>
+          <p:cNvGrpSpPr/>
+          <p:nvPr/>
+        </p:nvGrpSpPr>
+        <p:grpSpPr>
+          <a:xfrm>
+            <a:off x="1289317" y="-783526"/>
+            <a:ext cx="7327365" cy="9016545"/>
+            <a:chOff x="1313051" y="-925041"/>
+            <a:chExt cx="7327366" cy="9016545"/>
+          </a:xfrm>
+        </p:grpSpPr>
+        <p:pic>
+          <p:nvPicPr>
+            <p:cNvPr id="1026" name="Picture 2">
+              <a:extLst>
+                <a:ext uri="{FF2B5EF4-FFF2-40B4-BE49-F238E27FC236}">
+                  <a16:creationId xmlns:a16="http://schemas.microsoft.com/office/drawing/2014/main" id="{E9D6C10D-BA45-3853-C11E-846C156A864D}"/>
+                </a:ext>
+              </a:extLst>
+            </p:cNvPr>
+            <p:cNvPicPr>
+              <a:picLocks noChangeAspect="1" noChangeArrowheads="1"/>
+            </p:cNvPicPr>
+            <p:nvPr/>
+          </p:nvPicPr>
+          <p:blipFill>
+            <a:blip r:embed="rId2">
+              <a:extLst>
+                <a:ext uri="{28A0092B-C50C-407E-A947-70E740481C1C}">
+                  <a14:useLocalDpi xmlns:a14="http://schemas.microsoft.com/office/drawing/2010/main" val="0"/>
+                </a:ext>
+              </a:extLst>
+            </a:blip>
+            <a:srcRect/>
+            <a:stretch>
+              <a:fillRect/>
+            </a:stretch>
+          </p:blipFill>
+          <p:spPr bwMode="auto">
+            <a:xfrm>
+              <a:off x="1653209" y="-804889"/>
+              <a:ext cx="6987208" cy="4990862"/>
+            </a:xfrm>
+            <a:prstGeom prst="rect">
+              <a:avLst/>
+            </a:prstGeom>
+            <a:noFill/>
+            <a:extLst>
+              <a:ext uri="{909E8E84-426E-40DD-AFC4-6F175D3DCCD1}">
+                <a14:hiddenFill xmlns:a14="http://schemas.microsoft.com/office/drawing/2010/main">
+                  <a:solidFill>
+                    <a:srgbClr val="FFFFFF"/>
+                  </a:solidFill>
+                </a14:hiddenFill>
+              </a:ext>
+            </a:extLst>
+          </p:spPr>
+        </p:pic>
+        <p:sp>
+          <p:nvSpPr>
+            <p:cNvPr id="2" name="TextBox 1">
+              <a:extLst>
+                <a:ext uri="{FF2B5EF4-FFF2-40B4-BE49-F238E27FC236}">
+                  <a16:creationId xmlns:a16="http://schemas.microsoft.com/office/drawing/2014/main" id="{40FBB9C2-C102-D4FB-EA8D-019370027411}"/>
+                </a:ext>
+              </a:extLst>
+            </p:cNvPr>
+            <p:cNvSpPr txBox="1"/>
+            <p:nvPr/>
+          </p:nvSpPr>
+          <p:spPr>
+            <a:xfrm>
+              <a:off x="1313051" y="-925041"/>
+              <a:ext cx="340158" cy="369332"/>
+            </a:xfrm>
+            <a:prstGeom prst="rect">
+              <a:avLst/>
+            </a:prstGeom>
+            <a:noFill/>
+          </p:spPr>
+          <p:txBody>
+            <a:bodyPr wrap="none" rtlCol="0">
+              <a:spAutoFit/>
+            </a:bodyPr>
+            <a:lstStyle/>
+            <a:p>
+              <a:r>
+                <a:rPr lang="en-US" b="1" dirty="0">
+                  <a:latin typeface="Roboto" panose="02000000000000000000" pitchFamily="2" charset="0"/>
+                  <a:ea typeface="Roboto" panose="02000000000000000000" pitchFamily="2" charset="0"/>
+                </a:rPr>
+                <a:t>A</a:t>
+              </a:r>
+            </a:p>
+          </p:txBody>
+        </p:sp>
+        <p:pic>
+          <p:nvPicPr>
+            <p:cNvPr id="3" name="Picture 2">
+              <a:extLst>
+                <a:ext uri="{FF2B5EF4-FFF2-40B4-BE49-F238E27FC236}">
+                  <a16:creationId xmlns:a16="http://schemas.microsoft.com/office/drawing/2014/main" id="{732BF47E-2663-8CE5-F08F-6047DBC5D8BF}"/>
+                </a:ext>
+              </a:extLst>
+            </p:cNvPr>
+            <p:cNvPicPr>
+              <a:picLocks noChangeAspect="1"/>
+            </p:cNvPicPr>
+            <p:nvPr/>
+          </p:nvPicPr>
+          <p:blipFill>
+            <a:blip r:embed="rId3"/>
+            <a:stretch>
+              <a:fillRect/>
+            </a:stretch>
+          </p:blipFill>
+          <p:spPr>
+            <a:xfrm>
+              <a:off x="1653209" y="4417991"/>
+              <a:ext cx="6852149" cy="3673513"/>
+            </a:xfrm>
+            <a:prstGeom prst="rect">
+              <a:avLst/>
+            </a:prstGeom>
+          </p:spPr>
+        </p:pic>
+        <p:sp>
+          <p:nvSpPr>
+            <p:cNvPr id="13" name="TextBox 12">
+              <a:extLst>
+                <a:ext uri="{FF2B5EF4-FFF2-40B4-BE49-F238E27FC236}">
+                  <a16:creationId xmlns:a16="http://schemas.microsoft.com/office/drawing/2014/main" id="{D524B921-35FE-0201-03B0-1487880A1550}"/>
+                </a:ext>
+              </a:extLst>
+            </p:cNvPr>
+            <p:cNvSpPr txBox="1"/>
+            <p:nvPr/>
+          </p:nvSpPr>
+          <p:spPr>
+            <a:xfrm>
+              <a:off x="1483130" y="4307343"/>
+              <a:ext cx="340158" cy="369332"/>
+            </a:xfrm>
+            <a:prstGeom prst="rect">
+              <a:avLst/>
+            </a:prstGeom>
+            <a:noFill/>
+          </p:spPr>
+          <p:txBody>
+            <a:bodyPr wrap="none" rtlCol="0">
+              <a:spAutoFit/>
+            </a:bodyPr>
+            <a:lstStyle/>
+            <a:p>
+              <a:r>
+                <a:rPr lang="en-US" b="1" dirty="0">
+                  <a:latin typeface="Roboto" panose="02000000000000000000" pitchFamily="2" charset="0"/>
+                  <a:ea typeface="Roboto" panose="02000000000000000000" pitchFamily="2" charset="0"/>
+                </a:rPr>
+                <a:t>B</a:t>
+              </a:r>
+            </a:p>
+          </p:txBody>
+        </p:sp>
+      </p:grpSp>
+    </p:spTree>
+    <p:extLst>
+      <p:ext uri="{BB962C8B-B14F-4D97-AF65-F5344CB8AC3E}">
+        <p14:creationId xmlns:p14="http://schemas.microsoft.com/office/powerpoint/2010/main" val="117667025"/>
+      </p:ext>
+    </p:extLst>
+  </p:cSld>
+  <p:clrMapOvr>
+    <a:masterClrMapping/>
+  </p:clrMapOvr>
+</p:sld>
+</file>
+
+<file path=ppt/slides/slide4.xml><?xml version="1.0" encoding="utf-8"?>
+<p:sld xmlns:a="http://schemas.openxmlformats.org/drawingml/2006/main" xmlns:r="http://schemas.openxmlformats.org/officeDocument/2006/relationships" xmlns:p="http://schemas.openxmlformats.org/presentationml/2006/main">
+  <p:cSld>
+    <p:spTree>
+      <p:nvGrpSpPr>
+        <p:cNvPr id="1" name=""/>
+        <p:cNvGrpSpPr/>
+        <p:nvPr/>
+      </p:nvGrpSpPr>
+      <p:grpSpPr>
+        <a:xfrm>
+          <a:off x="0" y="0"/>
+          <a:ext cx="0" cy="0"/>
+          <a:chOff x="0" y="0"/>
+          <a:chExt cx="0" cy="0"/>
+        </a:xfrm>
+      </p:grpSpPr>
+      <p:pic>
+        <p:nvPicPr>
+          <p:cNvPr id="16" name="Picture 15">
+            <a:extLst>
+              <a:ext uri="{FF2B5EF4-FFF2-40B4-BE49-F238E27FC236}">
+                <a16:creationId xmlns:a16="http://schemas.microsoft.com/office/drawing/2014/main" id="{2B367FF2-A5DA-A1B2-588C-4A1619E2F567}"/>
+              </a:ext>
+            </a:extLst>
+          </p:cNvPr>
+          <p:cNvPicPr>
+            <a:picLocks noChangeAspect="1"/>
+          </p:cNvPicPr>
+          <p:nvPr/>
+        </p:nvPicPr>
+        <p:blipFill>
+          <a:blip r:embed="rId2"/>
+          <a:stretch>
+            <a:fillRect/>
+          </a:stretch>
+        </p:blipFill>
+        <p:spPr>
+          <a:xfrm>
+            <a:off x="1507238" y="4359853"/>
+            <a:ext cx="7772400" cy="1943100"/>
+          </a:xfrm>
+          <a:prstGeom prst="rect">
+            <a:avLst/>
+          </a:prstGeom>
+        </p:spPr>
+      </p:pic>
+      <p:sp>
+        <p:nvSpPr>
+          <p:cNvPr id="6" name="TextBox 5">
+            <a:extLst>
+              <a:ext uri="{FF2B5EF4-FFF2-40B4-BE49-F238E27FC236}">
+                <a16:creationId xmlns:a16="http://schemas.microsoft.com/office/drawing/2014/main" id="{42EE8970-3108-087E-6683-F8E53C45824E}"/>
+              </a:ext>
+            </a:extLst>
+          </p:cNvPr>
+          <p:cNvSpPr txBox="1"/>
+          <p:nvPr/>
+        </p:nvSpPr>
+        <p:spPr>
+          <a:xfrm>
+            <a:off x="4079191" y="3990521"/>
+            <a:ext cx="1960793" cy="369332"/>
+          </a:xfrm>
+          <a:prstGeom prst="rect">
+            <a:avLst/>
+          </a:prstGeom>
+          <a:noFill/>
+        </p:spPr>
+        <p:txBody>
+          <a:bodyPr wrap="none" rtlCol="0">
+            <a:spAutoFit/>
+          </a:bodyPr>
+          <a:lstStyle/>
+          <a:p>
+            <a:r>
+              <a:rPr lang="en-US" b="1" dirty="0">
+                <a:latin typeface="Roboto" panose="02000000000000000000" pitchFamily="2" charset="0"/>
+                <a:ea typeface="Roboto" panose="02000000000000000000" pitchFamily="2" charset="0"/>
+              </a:rPr>
+              <a:t>Palmer Penguins</a:t>
+            </a:r>
+          </a:p>
+        </p:txBody>
+      </p:sp>
+      <p:sp>
+        <p:nvSpPr>
+          <p:cNvPr id="8" name="TextBox 7">
+            <a:extLst>
+              <a:ext uri="{FF2B5EF4-FFF2-40B4-BE49-F238E27FC236}">
+                <a16:creationId xmlns:a16="http://schemas.microsoft.com/office/drawing/2014/main" id="{B916AD65-F139-8C6E-6BB2-21D97658DA4D}"/>
+              </a:ext>
+            </a:extLst>
+          </p:cNvPr>
+          <p:cNvSpPr txBox="1"/>
+          <p:nvPr/>
+        </p:nvSpPr>
+        <p:spPr>
+          <a:xfrm>
+            <a:off x="2453057" y="3990521"/>
+            <a:ext cx="340158" cy="369332"/>
+          </a:xfrm>
+          <a:prstGeom prst="rect">
+            <a:avLst/>
+          </a:prstGeom>
+          <a:noFill/>
+        </p:spPr>
+        <p:txBody>
+          <a:bodyPr wrap="none" rtlCol="0">
+            <a:spAutoFit/>
+          </a:bodyPr>
+          <a:lstStyle/>
+          <a:p>
+            <a:r>
+              <a:rPr lang="en-US" b="1" dirty="0">
+                <a:latin typeface="Roboto" panose="02000000000000000000" pitchFamily="2" charset="0"/>
+                <a:ea typeface="Roboto" panose="02000000000000000000" pitchFamily="2" charset="0"/>
+              </a:rPr>
+              <a:t>C</a:t>
+            </a:r>
+          </a:p>
+        </p:txBody>
+      </p:sp>
+      <p:sp>
+        <p:nvSpPr>
+          <p:cNvPr id="17" name="TextBox 16">
+            <a:extLst>
+              <a:ext uri="{FF2B5EF4-FFF2-40B4-BE49-F238E27FC236}">
+                <a16:creationId xmlns:a16="http://schemas.microsoft.com/office/drawing/2014/main" id="{011E9E81-9068-2F8E-9609-EE8A88340322}"/>
+              </a:ext>
+            </a:extLst>
+          </p:cNvPr>
+          <p:cNvSpPr txBox="1"/>
+          <p:nvPr/>
+        </p:nvSpPr>
+        <p:spPr>
+          <a:xfrm>
+            <a:off x="3100275" y="605060"/>
+            <a:ext cx="516488" cy="369332"/>
+          </a:xfrm>
+          <a:prstGeom prst="rect">
+            <a:avLst/>
+          </a:prstGeom>
+          <a:noFill/>
+        </p:spPr>
+        <p:txBody>
+          <a:bodyPr wrap="none" rtlCol="0">
+            <a:spAutoFit/>
+          </a:bodyPr>
+          <a:lstStyle/>
+          <a:p>
+            <a:r>
+              <a:rPr lang="en-US" b="1" dirty="0">
+                <a:latin typeface="Roboto" panose="02000000000000000000" pitchFamily="2" charset="0"/>
+                <a:ea typeface="Roboto" panose="02000000000000000000" pitchFamily="2" charset="0"/>
+              </a:rPr>
+              <a:t>Iris</a:t>
+            </a:r>
+          </a:p>
+        </p:txBody>
+      </p:sp>
+      <p:pic>
+        <p:nvPicPr>
+          <p:cNvPr id="20" name="Picture 19">
+            <a:extLst>
+              <a:ext uri="{FF2B5EF4-FFF2-40B4-BE49-F238E27FC236}">
+                <a16:creationId xmlns:a16="http://schemas.microsoft.com/office/drawing/2014/main" id="{378B2E92-E3FF-E0A1-33F2-6FABA1DF8DFB}"/>
+              </a:ext>
+            </a:extLst>
+          </p:cNvPr>
+          <p:cNvPicPr>
+            <a:picLocks noChangeAspect="1"/>
+          </p:cNvPicPr>
+          <p:nvPr/>
+        </p:nvPicPr>
+        <p:blipFill>
+          <a:blip r:embed="rId3"/>
+          <a:stretch>
+            <a:fillRect/>
+          </a:stretch>
+        </p:blipFill>
+        <p:spPr>
+          <a:xfrm>
+            <a:off x="6205729" y="1145196"/>
+            <a:ext cx="3559001" cy="2224375"/>
+          </a:xfrm>
+          <a:prstGeom prst="rect">
+            <a:avLst/>
+          </a:prstGeom>
+        </p:spPr>
+      </p:pic>
+      <p:sp>
+        <p:nvSpPr>
+          <p:cNvPr id="25" name="TextBox 24">
+            <a:extLst>
+              <a:ext uri="{FF2B5EF4-FFF2-40B4-BE49-F238E27FC236}">
+                <a16:creationId xmlns:a16="http://schemas.microsoft.com/office/drawing/2014/main" id="{C1FF7C96-88F3-8E08-A774-DD6C0AF5C60A}"/>
+              </a:ext>
+            </a:extLst>
+          </p:cNvPr>
+          <p:cNvSpPr txBox="1"/>
+          <p:nvPr/>
+        </p:nvSpPr>
+        <p:spPr>
+          <a:xfrm>
+            <a:off x="7411018" y="735296"/>
+            <a:ext cx="901209" cy="369332"/>
+          </a:xfrm>
+          <a:prstGeom prst="rect">
+            <a:avLst/>
+          </a:prstGeom>
+          <a:noFill/>
+        </p:spPr>
+        <p:txBody>
+          <a:bodyPr wrap="none" rtlCol="0">
+            <a:spAutoFit/>
+          </a:bodyPr>
+          <a:lstStyle/>
+          <a:p>
+            <a:r>
+              <a:rPr lang="en-US" b="1" dirty="0">
+                <a:latin typeface="Roboto" panose="02000000000000000000" pitchFamily="2" charset="0"/>
+                <a:ea typeface="Roboto" panose="02000000000000000000" pitchFamily="2" charset="0"/>
+              </a:rPr>
+              <a:t>Titanic</a:t>
+            </a:r>
+          </a:p>
+        </p:txBody>
+      </p:sp>
+      <p:sp>
+        <p:nvSpPr>
+          <p:cNvPr id="28" name="TextBox 27">
+            <a:extLst>
+              <a:ext uri="{FF2B5EF4-FFF2-40B4-BE49-F238E27FC236}">
+                <a16:creationId xmlns:a16="http://schemas.microsoft.com/office/drawing/2014/main" id="{3CD5CF43-0D72-A939-4103-458B6652491E}"/>
+              </a:ext>
+            </a:extLst>
+          </p:cNvPr>
+          <p:cNvSpPr txBox="1"/>
+          <p:nvPr/>
+        </p:nvSpPr>
+        <p:spPr>
+          <a:xfrm>
+            <a:off x="6408824" y="775864"/>
+            <a:ext cx="340158" cy="369332"/>
+          </a:xfrm>
+          <a:prstGeom prst="rect">
+            <a:avLst/>
+          </a:prstGeom>
+          <a:noFill/>
+        </p:spPr>
+        <p:txBody>
+          <a:bodyPr wrap="none" rtlCol="0">
+            <a:spAutoFit/>
+          </a:bodyPr>
+          <a:lstStyle/>
+          <a:p>
+            <a:r>
+              <a:rPr lang="en-US" b="1" dirty="0">
+                <a:latin typeface="Roboto" panose="02000000000000000000" pitchFamily="2" charset="0"/>
+                <a:ea typeface="Roboto" panose="02000000000000000000" pitchFamily="2" charset="0"/>
+              </a:rPr>
+              <a:t>B</a:t>
+            </a:r>
+          </a:p>
+        </p:txBody>
+      </p:sp>
+      <p:sp>
+        <p:nvSpPr>
+          <p:cNvPr id="7" name="TextBox 6">
+            <a:extLst>
+              <a:ext uri="{FF2B5EF4-FFF2-40B4-BE49-F238E27FC236}">
+                <a16:creationId xmlns:a16="http://schemas.microsoft.com/office/drawing/2014/main" id="{0DF8DD66-62D3-6E8B-630A-B48CD0566883}"/>
+              </a:ext>
+            </a:extLst>
+          </p:cNvPr>
+          <p:cNvSpPr txBox="1"/>
+          <p:nvPr/>
+        </p:nvSpPr>
+        <p:spPr>
+          <a:xfrm>
+            <a:off x="927594" y="697395"/>
+            <a:ext cx="340158" cy="369332"/>
+          </a:xfrm>
+          <a:prstGeom prst="rect">
+            <a:avLst/>
+          </a:prstGeom>
+          <a:noFill/>
+        </p:spPr>
+        <p:txBody>
+          <a:bodyPr wrap="none" rtlCol="0">
+            <a:spAutoFit/>
+          </a:bodyPr>
+          <a:lstStyle/>
+          <a:p>
+            <a:r>
+              <a:rPr lang="en-US" b="1" dirty="0">
+                <a:latin typeface="Roboto" panose="02000000000000000000" pitchFamily="2" charset="0"/>
+                <a:ea typeface="Roboto" panose="02000000000000000000" pitchFamily="2" charset="0"/>
+              </a:rPr>
+              <a:t>A</a:t>
+            </a:r>
+          </a:p>
+        </p:txBody>
+      </p:sp>
+      <p:pic>
+        <p:nvPicPr>
+          <p:cNvPr id="34" name="Content Placeholder 33">
+            <a:extLst>
+              <a:ext uri="{FF2B5EF4-FFF2-40B4-BE49-F238E27FC236}">
+                <a16:creationId xmlns:a16="http://schemas.microsoft.com/office/drawing/2014/main" id="{2C44C4F2-4AEB-7198-D786-7E8C6198F7A7}"/>
+              </a:ext>
+            </a:extLst>
+          </p:cNvPr>
+          <p:cNvPicPr>
+            <a:picLocks noGrp="1" noChangeAspect="1"/>
+          </p:cNvPicPr>
+          <p:nvPr>
+            <p:ph idx="1"/>
+          </p:nvPr>
+        </p:nvPicPr>
+        <p:blipFill>
+          <a:blip r:embed="rId4"/>
+          <a:stretch>
+            <a:fillRect/>
+          </a:stretch>
+        </p:blipFill>
+        <p:spPr>
+          <a:xfrm>
+            <a:off x="927595" y="1069386"/>
+            <a:ext cx="4939806" cy="2469903"/>
+          </a:xfrm>
+        </p:spPr>
+      </p:pic>
+    </p:spTree>
+    <p:extLst>
+      <p:ext uri="{BB962C8B-B14F-4D97-AF65-F5344CB8AC3E}">
+        <p14:creationId xmlns:p14="http://schemas.microsoft.com/office/powerpoint/2010/main" val="3032404688"/>
+      </p:ext>
+    </p:extLst>
+  </p:cSld>
+  <p:clrMapOvr>
+    <a:masterClrMapping/>
+  </p:clrMapOvr>
+</p:sld>
+</file>
+
+<file path=ppt/slides/slide5.xml><?xml version="1.0" encoding="utf-8"?>
+<p:sld xmlns:a="http://schemas.openxmlformats.org/drawingml/2006/main" xmlns:r="http://schemas.openxmlformats.org/officeDocument/2006/relationships" xmlns:p="http://schemas.openxmlformats.org/presentationml/2006/main">
+  <p:cSld>
+    <p:spTree>
+      <p:nvGrpSpPr>
+        <p:cNvPr id="1" name="">
+          <a:extLst>
+            <a:ext uri="{FF2B5EF4-FFF2-40B4-BE49-F238E27FC236}">
+              <a16:creationId xmlns:a16="http://schemas.microsoft.com/office/drawing/2014/main" id="{E68AE4DA-E723-BAE6-1FAA-4065F0174D00}"/>
+            </a:ext>
+          </a:extLst>
+        </p:cNvPr>
+        <p:cNvGrpSpPr/>
+        <p:nvPr/>
+      </p:nvGrpSpPr>
+      <p:grpSpPr>
+        <a:xfrm>
+          <a:off x="0" y="0"/>
+          <a:ext cx="0" cy="0"/>
+          <a:chOff x="0" y="0"/>
+          <a:chExt cx="0" cy="0"/>
+        </a:xfrm>
+      </p:grpSpPr>
+      <p:pic>
+        <p:nvPicPr>
+          <p:cNvPr id="16" name="Picture 15">
+            <a:extLst>
+              <a:ext uri="{FF2B5EF4-FFF2-40B4-BE49-F238E27FC236}">
+                <a16:creationId xmlns:a16="http://schemas.microsoft.com/office/drawing/2014/main" id="{937A0955-216D-D410-FF0A-FF72F9A04E4C}"/>
+              </a:ext>
+            </a:extLst>
+          </p:cNvPr>
+          <p:cNvPicPr>
+            <a:picLocks noChangeAspect="1"/>
+          </p:cNvPicPr>
+          <p:nvPr/>
+        </p:nvPicPr>
+        <p:blipFill>
+          <a:blip r:embed="rId2"/>
+          <a:stretch>
+            <a:fillRect/>
+          </a:stretch>
+        </p:blipFill>
+        <p:spPr>
+          <a:xfrm>
+            <a:off x="1496728" y="4309840"/>
+            <a:ext cx="7772400" cy="1943100"/>
+          </a:xfrm>
+          <a:prstGeom prst="rect">
+            <a:avLst/>
+          </a:prstGeom>
+        </p:spPr>
+      </p:pic>
+      <p:sp>
+        <p:nvSpPr>
+          <p:cNvPr id="6" name="TextBox 5">
+            <a:extLst>
+              <a:ext uri="{FF2B5EF4-FFF2-40B4-BE49-F238E27FC236}">
+                <a16:creationId xmlns:a16="http://schemas.microsoft.com/office/drawing/2014/main" id="{D239F4E7-150E-B8B9-9F4B-61BDEC2D620F}"/>
+              </a:ext>
+            </a:extLst>
+          </p:cNvPr>
+          <p:cNvSpPr txBox="1"/>
+          <p:nvPr/>
+        </p:nvSpPr>
+        <p:spPr>
+          <a:xfrm>
+            <a:off x="4068681" y="3940508"/>
+            <a:ext cx="1960793" cy="369332"/>
+          </a:xfrm>
+          <a:prstGeom prst="rect">
+            <a:avLst/>
+          </a:prstGeom>
+          <a:noFill/>
+        </p:spPr>
+        <p:txBody>
+          <a:bodyPr wrap="none" rtlCol="0">
+            <a:spAutoFit/>
+          </a:bodyPr>
+          <a:lstStyle/>
+          <a:p>
+            <a:r>
+              <a:rPr lang="en-US" b="1" dirty="0">
+                <a:latin typeface="Roboto" panose="02000000000000000000" pitchFamily="2" charset="0"/>
+                <a:ea typeface="Roboto" panose="02000000000000000000" pitchFamily="2" charset="0"/>
+              </a:rPr>
+              <a:t>Palmer Penguins</a:t>
+            </a:r>
+          </a:p>
+        </p:txBody>
+      </p:sp>
+      <p:sp>
+        <p:nvSpPr>
+          <p:cNvPr id="8" name="TextBox 7">
+            <a:extLst>
+              <a:ext uri="{FF2B5EF4-FFF2-40B4-BE49-F238E27FC236}">
+                <a16:creationId xmlns:a16="http://schemas.microsoft.com/office/drawing/2014/main" id="{2AD0A436-9C14-4F66-AC74-66FF2719889C}"/>
+              </a:ext>
+            </a:extLst>
+          </p:cNvPr>
+          <p:cNvSpPr txBox="1"/>
+          <p:nvPr/>
+        </p:nvSpPr>
+        <p:spPr>
+          <a:xfrm>
+            <a:off x="2442547" y="3940508"/>
+            <a:ext cx="340158" cy="369332"/>
+          </a:xfrm>
+          <a:prstGeom prst="rect">
+            <a:avLst/>
+          </a:prstGeom>
+          <a:noFill/>
+        </p:spPr>
+        <p:txBody>
+          <a:bodyPr wrap="none" rtlCol="0">
+            <a:spAutoFit/>
+          </a:bodyPr>
+          <a:lstStyle/>
+          <a:p>
+            <a:r>
+              <a:rPr lang="en-US" b="1" dirty="0">
+                <a:latin typeface="Roboto" panose="02000000000000000000" pitchFamily="2" charset="0"/>
+                <a:ea typeface="Roboto" panose="02000000000000000000" pitchFamily="2" charset="0"/>
+              </a:rPr>
+              <a:t>C</a:t>
+            </a:r>
+          </a:p>
+        </p:txBody>
+      </p:sp>
+      <p:sp>
+        <p:nvSpPr>
+          <p:cNvPr id="17" name="TextBox 16">
+            <a:extLst>
+              <a:ext uri="{FF2B5EF4-FFF2-40B4-BE49-F238E27FC236}">
+                <a16:creationId xmlns:a16="http://schemas.microsoft.com/office/drawing/2014/main" id="{71E11E44-A34A-6F9A-C3CE-21B2A1923293}"/>
+              </a:ext>
+            </a:extLst>
+          </p:cNvPr>
+          <p:cNvSpPr txBox="1"/>
+          <p:nvPr/>
+        </p:nvSpPr>
+        <p:spPr>
+          <a:xfrm>
+            <a:off x="3417362" y="733972"/>
+            <a:ext cx="516488" cy="369332"/>
+          </a:xfrm>
+          <a:prstGeom prst="rect">
+            <a:avLst/>
+          </a:prstGeom>
+          <a:noFill/>
+        </p:spPr>
+        <p:txBody>
+          <a:bodyPr wrap="none" rtlCol="0">
+            <a:spAutoFit/>
+          </a:bodyPr>
+          <a:lstStyle/>
+          <a:p>
+            <a:r>
+              <a:rPr lang="en-US" b="1" dirty="0">
+                <a:latin typeface="Roboto" panose="02000000000000000000" pitchFamily="2" charset="0"/>
+                <a:ea typeface="Roboto" panose="02000000000000000000" pitchFamily="2" charset="0"/>
+              </a:rPr>
+              <a:t>Iris</a:t>
+            </a:r>
+          </a:p>
+        </p:txBody>
+      </p:sp>
+      <p:sp>
+        <p:nvSpPr>
+          <p:cNvPr id="25" name="TextBox 24">
+            <a:extLst>
+              <a:ext uri="{FF2B5EF4-FFF2-40B4-BE49-F238E27FC236}">
+                <a16:creationId xmlns:a16="http://schemas.microsoft.com/office/drawing/2014/main" id="{B0495431-5841-4CAB-89E0-2BC65F56A62A}"/>
+              </a:ext>
+            </a:extLst>
+          </p:cNvPr>
+          <p:cNvSpPr txBox="1"/>
+          <p:nvPr/>
+        </p:nvSpPr>
+        <p:spPr>
+          <a:xfrm>
+            <a:off x="7395641" y="733972"/>
+            <a:ext cx="901209" cy="369332"/>
+          </a:xfrm>
+          <a:prstGeom prst="rect">
+            <a:avLst/>
+          </a:prstGeom>
+          <a:noFill/>
+        </p:spPr>
+        <p:txBody>
+          <a:bodyPr wrap="none" rtlCol="0">
+            <a:spAutoFit/>
+          </a:bodyPr>
+          <a:lstStyle/>
+          <a:p>
+            <a:r>
+              <a:rPr lang="en-US" b="1" dirty="0">
+                <a:latin typeface="Roboto" panose="02000000000000000000" pitchFamily="2" charset="0"/>
+                <a:ea typeface="Roboto" panose="02000000000000000000" pitchFamily="2" charset="0"/>
+              </a:rPr>
+              <a:t>Titanic</a:t>
+            </a:r>
+          </a:p>
+        </p:txBody>
+      </p:sp>
+      <p:sp>
+        <p:nvSpPr>
+          <p:cNvPr id="28" name="TextBox 27">
+            <a:extLst>
+              <a:ext uri="{FF2B5EF4-FFF2-40B4-BE49-F238E27FC236}">
+                <a16:creationId xmlns:a16="http://schemas.microsoft.com/office/drawing/2014/main" id="{AC1D7173-8CA2-0DFA-3CA9-A584ED796AC0}"/>
+              </a:ext>
+            </a:extLst>
+          </p:cNvPr>
+          <p:cNvSpPr txBox="1"/>
+          <p:nvPr/>
+        </p:nvSpPr>
+        <p:spPr>
+          <a:xfrm>
+            <a:off x="6488639" y="705979"/>
+            <a:ext cx="340158" cy="369332"/>
+          </a:xfrm>
+          <a:prstGeom prst="rect">
+            <a:avLst/>
+          </a:prstGeom>
+          <a:noFill/>
+        </p:spPr>
+        <p:txBody>
+          <a:bodyPr wrap="none" rtlCol="0">
+            <a:spAutoFit/>
+          </a:bodyPr>
+          <a:lstStyle/>
+          <a:p>
+            <a:r>
+              <a:rPr lang="en-US" b="1" dirty="0">
+                <a:latin typeface="Roboto" panose="02000000000000000000" pitchFamily="2" charset="0"/>
+                <a:ea typeface="Roboto" panose="02000000000000000000" pitchFamily="2" charset="0"/>
+              </a:rPr>
+              <a:t>B</a:t>
+            </a:r>
+          </a:p>
+        </p:txBody>
+      </p:sp>
+      <p:sp>
+        <p:nvSpPr>
+          <p:cNvPr id="7" name="TextBox 6">
+            <a:extLst>
+              <a:ext uri="{FF2B5EF4-FFF2-40B4-BE49-F238E27FC236}">
+                <a16:creationId xmlns:a16="http://schemas.microsoft.com/office/drawing/2014/main" id="{29D68C3D-0C67-001C-6F47-C6927454F5EE}"/>
+              </a:ext>
+            </a:extLst>
+          </p:cNvPr>
+          <p:cNvSpPr txBox="1"/>
+          <p:nvPr/>
+        </p:nvSpPr>
+        <p:spPr>
+          <a:xfrm>
+            <a:off x="927594" y="705979"/>
+            <a:ext cx="340158" cy="369332"/>
+          </a:xfrm>
+          <a:prstGeom prst="rect">
+            <a:avLst/>
+          </a:prstGeom>
+          <a:noFill/>
+        </p:spPr>
+        <p:txBody>
+          <a:bodyPr wrap="none" rtlCol="0">
+            <a:spAutoFit/>
+          </a:bodyPr>
+          <a:lstStyle/>
+          <a:p>
+            <a:r>
+              <a:rPr lang="en-US" b="1" dirty="0">
+                <a:latin typeface="Roboto" panose="02000000000000000000" pitchFamily="2" charset="0"/>
+                <a:ea typeface="Roboto" panose="02000000000000000000" pitchFamily="2" charset="0"/>
+              </a:rPr>
+              <a:t>A</a:t>
+            </a:r>
+          </a:p>
+        </p:txBody>
+      </p:sp>
+      <p:pic>
+        <p:nvPicPr>
+          <p:cNvPr id="26" name="Picture 25">
+            <a:extLst>
+              <a:ext uri="{FF2B5EF4-FFF2-40B4-BE49-F238E27FC236}">
+                <a16:creationId xmlns:a16="http://schemas.microsoft.com/office/drawing/2014/main" id="{5E4DFB84-7201-6239-DF9C-69E6FCA016C0}"/>
+              </a:ext>
+            </a:extLst>
+          </p:cNvPr>
+          <p:cNvPicPr>
+            <a:picLocks noChangeAspect="1"/>
+          </p:cNvPicPr>
+          <p:nvPr/>
+        </p:nvPicPr>
+        <p:blipFill>
+          <a:blip r:embed="rId3"/>
+          <a:stretch>
+            <a:fillRect/>
+          </a:stretch>
+        </p:blipFill>
+        <p:spPr>
+          <a:xfrm>
+            <a:off x="927214" y="1112412"/>
+            <a:ext cx="4862609" cy="2431305"/>
+          </a:xfrm>
+          <a:prstGeom prst="rect">
+            <a:avLst/>
+          </a:prstGeom>
+        </p:spPr>
+      </p:pic>
+      <p:pic>
+        <p:nvPicPr>
+          <p:cNvPr id="29" name="Picture 28">
+            <a:extLst>
+              <a:ext uri="{FF2B5EF4-FFF2-40B4-BE49-F238E27FC236}">
+                <a16:creationId xmlns:a16="http://schemas.microsoft.com/office/drawing/2014/main" id="{95851048-56A3-F9D8-3623-AA55EADFBC7B}"/>
+              </a:ext>
+            </a:extLst>
+          </p:cNvPr>
+          <p:cNvPicPr>
+            <a:picLocks noChangeAspect="1"/>
+          </p:cNvPicPr>
+          <p:nvPr/>
+        </p:nvPicPr>
+        <p:blipFill>
+          <a:blip r:embed="rId4"/>
+          <a:stretch>
+            <a:fillRect/>
+          </a:stretch>
+        </p:blipFill>
+        <p:spPr>
+          <a:xfrm>
+            <a:off x="6284532" y="1117202"/>
+            <a:ext cx="3480198" cy="2175123"/>
+          </a:xfrm>
+          <a:prstGeom prst="rect">
+            <a:avLst/>
+          </a:prstGeom>
+        </p:spPr>
+      </p:pic>
+    </p:spTree>
+    <p:extLst>
+      <p:ext uri="{BB962C8B-B14F-4D97-AF65-F5344CB8AC3E}">
+        <p14:creationId xmlns:p14="http://schemas.microsoft.com/office/powerpoint/2010/main" val="2852249728"/>
+      </p:ext>
+    </p:extLst>
+  </p:cSld>
+  <p:clrMapOvr>
+    <a:masterClrMapping/>
+  </p:clrMapOvr>
+</p:sld>
+</file>
+
+<file path=ppt/slides/slide6.xml><?xml version="1.0" encoding="utf-8"?>
+<p:sld xmlns:a="http://schemas.openxmlformats.org/drawingml/2006/main" xmlns:r="http://schemas.openxmlformats.org/officeDocument/2006/relationships" xmlns:p="http://schemas.openxmlformats.org/presentationml/2006/main">
+  <p:cSld>
+    <p:spTree>
+      <p:nvGrpSpPr>
+        <p:cNvPr id="1" name="">
+          <a:extLst>
+            <a:ext uri="{FF2B5EF4-FFF2-40B4-BE49-F238E27FC236}">
+              <a16:creationId xmlns:a16="http://schemas.microsoft.com/office/drawing/2014/main" id="{FC6F5D72-A9BB-0C3A-F2F8-DAEBFDE2459F}"/>
+            </a:ext>
+          </a:extLst>
+        </p:cNvPr>
+        <p:cNvGrpSpPr/>
+        <p:nvPr/>
+      </p:nvGrpSpPr>
+      <p:grpSpPr>
+        <a:xfrm>
+          <a:off x="0" y="0"/>
+          <a:ext cx="0" cy="0"/>
+          <a:chOff x="0" y="0"/>
+          <a:chExt cx="0" cy="0"/>
+        </a:xfrm>
+      </p:grpSpPr>
+      <p:pic>
+        <p:nvPicPr>
+          <p:cNvPr id="16" name="Picture 15">
+            <a:extLst>
+              <a:ext uri="{FF2B5EF4-FFF2-40B4-BE49-F238E27FC236}">
+                <a16:creationId xmlns:a16="http://schemas.microsoft.com/office/drawing/2014/main" id="{E9E913CA-9246-397D-5E7E-D02AE3915739}"/>
+              </a:ext>
+            </a:extLst>
+          </p:cNvPr>
+          <p:cNvPicPr>
+            <a:picLocks noChangeAspect="1"/>
+          </p:cNvPicPr>
+          <p:nvPr/>
+        </p:nvPicPr>
+        <p:blipFill>
+          <a:blip r:embed="rId2"/>
+          <a:stretch>
+            <a:fillRect/>
+          </a:stretch>
+        </p:blipFill>
+        <p:spPr>
+          <a:xfrm>
+            <a:off x="1496728" y="4309840"/>
+            <a:ext cx="7772400" cy="1943100"/>
+          </a:xfrm>
+          <a:prstGeom prst="rect">
+            <a:avLst/>
+          </a:prstGeom>
+        </p:spPr>
+      </p:pic>
+      <p:sp>
+        <p:nvSpPr>
+          <p:cNvPr id="6" name="TextBox 5">
+            <a:extLst>
+              <a:ext uri="{FF2B5EF4-FFF2-40B4-BE49-F238E27FC236}">
+                <a16:creationId xmlns:a16="http://schemas.microsoft.com/office/drawing/2014/main" id="{DEDA6517-1595-E6D0-2897-861932AF7567}"/>
+              </a:ext>
+            </a:extLst>
+          </p:cNvPr>
+          <p:cNvSpPr txBox="1"/>
+          <p:nvPr/>
+        </p:nvSpPr>
+        <p:spPr>
+          <a:xfrm>
+            <a:off x="4068681" y="3940508"/>
+            <a:ext cx="1960793" cy="369332"/>
+          </a:xfrm>
+          <a:prstGeom prst="rect">
+            <a:avLst/>
+          </a:prstGeom>
+          <a:noFill/>
+        </p:spPr>
+        <p:txBody>
+          <a:bodyPr wrap="none" rtlCol="0">
+            <a:spAutoFit/>
+          </a:bodyPr>
+          <a:lstStyle/>
+          <a:p>
+            <a:r>
+              <a:rPr lang="en-US" b="1" dirty="0">
+                <a:latin typeface="Roboto" panose="02000000000000000000" pitchFamily="2" charset="0"/>
+                <a:ea typeface="Roboto" panose="02000000000000000000" pitchFamily="2" charset="0"/>
+              </a:rPr>
+              <a:t>Palmer Penguins</a:t>
+            </a:r>
+          </a:p>
+        </p:txBody>
+      </p:sp>
+      <p:sp>
+        <p:nvSpPr>
+          <p:cNvPr id="8" name="TextBox 7">
+            <a:extLst>
+              <a:ext uri="{FF2B5EF4-FFF2-40B4-BE49-F238E27FC236}">
+                <a16:creationId xmlns:a16="http://schemas.microsoft.com/office/drawing/2014/main" id="{B484409D-C021-CC1F-2C8C-EFA33F48080C}"/>
+              </a:ext>
+            </a:extLst>
+          </p:cNvPr>
+          <p:cNvSpPr txBox="1"/>
+          <p:nvPr/>
+        </p:nvSpPr>
+        <p:spPr>
+          <a:xfrm>
+            <a:off x="2442547" y="3940508"/>
+            <a:ext cx="340158" cy="369332"/>
+          </a:xfrm>
+          <a:prstGeom prst="rect">
+            <a:avLst/>
+          </a:prstGeom>
+          <a:noFill/>
+        </p:spPr>
+        <p:txBody>
+          <a:bodyPr wrap="none" rtlCol="0">
+            <a:spAutoFit/>
+          </a:bodyPr>
+          <a:lstStyle/>
+          <a:p>
+            <a:r>
+              <a:rPr lang="en-US" b="1" dirty="0">
+                <a:latin typeface="Roboto" panose="02000000000000000000" pitchFamily="2" charset="0"/>
+                <a:ea typeface="Roboto" panose="02000000000000000000" pitchFamily="2" charset="0"/>
+              </a:rPr>
+              <a:t>C</a:t>
+            </a:r>
+          </a:p>
+        </p:txBody>
+      </p:sp>
+      <p:sp>
+        <p:nvSpPr>
+          <p:cNvPr id="17" name="TextBox 16">
+            <a:extLst>
+              <a:ext uri="{FF2B5EF4-FFF2-40B4-BE49-F238E27FC236}">
+                <a16:creationId xmlns:a16="http://schemas.microsoft.com/office/drawing/2014/main" id="{5B837A7F-6560-F17E-8B0E-C77B00FECE0F}"/>
+              </a:ext>
+            </a:extLst>
+          </p:cNvPr>
+          <p:cNvSpPr txBox="1"/>
+          <p:nvPr/>
+        </p:nvSpPr>
+        <p:spPr>
+          <a:xfrm>
+            <a:off x="3417362" y="733972"/>
+            <a:ext cx="516488" cy="369332"/>
+          </a:xfrm>
+          <a:prstGeom prst="rect">
+            <a:avLst/>
+          </a:prstGeom>
+          <a:noFill/>
+        </p:spPr>
+        <p:txBody>
+          <a:bodyPr wrap="none" rtlCol="0">
+            <a:spAutoFit/>
+          </a:bodyPr>
+          <a:lstStyle/>
+          <a:p>
+            <a:r>
+              <a:rPr lang="en-US" b="1" dirty="0">
+                <a:latin typeface="Roboto" panose="02000000000000000000" pitchFamily="2" charset="0"/>
+                <a:ea typeface="Roboto" panose="02000000000000000000" pitchFamily="2" charset="0"/>
+              </a:rPr>
+              <a:t>Iris</a:t>
+            </a:r>
+          </a:p>
+        </p:txBody>
+      </p:sp>
+      <p:sp>
+        <p:nvSpPr>
+          <p:cNvPr id="25" name="TextBox 24">
+            <a:extLst>
+              <a:ext uri="{FF2B5EF4-FFF2-40B4-BE49-F238E27FC236}">
+                <a16:creationId xmlns:a16="http://schemas.microsoft.com/office/drawing/2014/main" id="{AE46EBC2-1BBC-E14B-E234-8A9EF50A1D2E}"/>
+              </a:ext>
+            </a:extLst>
+          </p:cNvPr>
+          <p:cNvSpPr txBox="1"/>
+          <p:nvPr/>
+        </p:nvSpPr>
+        <p:spPr>
+          <a:xfrm>
+            <a:off x="7395641" y="733972"/>
+            <a:ext cx="901209" cy="369332"/>
+          </a:xfrm>
+          <a:prstGeom prst="rect">
+            <a:avLst/>
+          </a:prstGeom>
+          <a:noFill/>
+        </p:spPr>
+        <p:txBody>
+          <a:bodyPr wrap="none" rtlCol="0">
+            <a:spAutoFit/>
+          </a:bodyPr>
+          <a:lstStyle/>
+          <a:p>
+            <a:r>
+              <a:rPr lang="en-US" b="1" dirty="0">
+                <a:latin typeface="Roboto" panose="02000000000000000000" pitchFamily="2" charset="0"/>
+                <a:ea typeface="Roboto" panose="02000000000000000000" pitchFamily="2" charset="0"/>
+              </a:rPr>
+              <a:t>Titanic</a:t>
+            </a:r>
+          </a:p>
+        </p:txBody>
+      </p:sp>
+      <p:sp>
+        <p:nvSpPr>
+          <p:cNvPr id="28" name="TextBox 27">
+            <a:extLst>
+              <a:ext uri="{FF2B5EF4-FFF2-40B4-BE49-F238E27FC236}">
+                <a16:creationId xmlns:a16="http://schemas.microsoft.com/office/drawing/2014/main" id="{2217A92A-C9C6-2F1C-9326-498E3B545433}"/>
+              </a:ext>
+            </a:extLst>
+          </p:cNvPr>
+          <p:cNvSpPr txBox="1"/>
+          <p:nvPr/>
+        </p:nvSpPr>
+        <p:spPr>
+          <a:xfrm>
+            <a:off x="6488639" y="705979"/>
+            <a:ext cx="340158" cy="369332"/>
+          </a:xfrm>
+          <a:prstGeom prst="rect">
+            <a:avLst/>
+          </a:prstGeom>
+          <a:noFill/>
+        </p:spPr>
+        <p:txBody>
+          <a:bodyPr wrap="none" rtlCol="0">
+            <a:spAutoFit/>
+          </a:bodyPr>
+          <a:lstStyle/>
+          <a:p>
+            <a:r>
+              <a:rPr lang="en-US" b="1" dirty="0">
+                <a:latin typeface="Roboto" panose="02000000000000000000" pitchFamily="2" charset="0"/>
+                <a:ea typeface="Roboto" panose="02000000000000000000" pitchFamily="2" charset="0"/>
+              </a:rPr>
+              <a:t>B</a:t>
+            </a:r>
+          </a:p>
+        </p:txBody>
+      </p:sp>
+      <p:sp>
+        <p:nvSpPr>
+          <p:cNvPr id="7" name="TextBox 6">
+            <a:extLst>
+              <a:ext uri="{FF2B5EF4-FFF2-40B4-BE49-F238E27FC236}">
+                <a16:creationId xmlns:a16="http://schemas.microsoft.com/office/drawing/2014/main" id="{0DE0F246-24FB-BD6B-70DC-331F8F6844E5}"/>
+              </a:ext>
+            </a:extLst>
+          </p:cNvPr>
+          <p:cNvSpPr txBox="1"/>
+          <p:nvPr/>
+        </p:nvSpPr>
+        <p:spPr>
+          <a:xfrm>
+            <a:off x="927594" y="705979"/>
+            <a:ext cx="340158" cy="369332"/>
+          </a:xfrm>
+          <a:prstGeom prst="rect">
+            <a:avLst/>
+          </a:prstGeom>
+          <a:noFill/>
+        </p:spPr>
+        <p:txBody>
+          <a:bodyPr wrap="none" rtlCol="0">
+            <a:spAutoFit/>
+          </a:bodyPr>
+          <a:lstStyle/>
+          <a:p>
+            <a:r>
+              <a:rPr lang="en-US" b="1" dirty="0">
+                <a:latin typeface="Roboto" panose="02000000000000000000" pitchFamily="2" charset="0"/>
+                <a:ea typeface="Roboto" panose="02000000000000000000" pitchFamily="2" charset="0"/>
+              </a:rPr>
+              <a:t>A</a:t>
+            </a:r>
+          </a:p>
+        </p:txBody>
+      </p:sp>
+      <p:pic>
+        <p:nvPicPr>
+          <p:cNvPr id="26" name="Picture 25">
+            <a:extLst>
+              <a:ext uri="{FF2B5EF4-FFF2-40B4-BE49-F238E27FC236}">
+                <a16:creationId xmlns:a16="http://schemas.microsoft.com/office/drawing/2014/main" id="{C2F0E377-77EC-45D8-7D7B-E67134518068}"/>
+              </a:ext>
+            </a:extLst>
+          </p:cNvPr>
+          <p:cNvPicPr>
+            <a:picLocks noChangeAspect="1"/>
+          </p:cNvPicPr>
+          <p:nvPr/>
+        </p:nvPicPr>
+        <p:blipFill>
+          <a:blip r:embed="rId3"/>
+          <a:stretch>
+            <a:fillRect/>
+          </a:stretch>
+        </p:blipFill>
+        <p:spPr>
+          <a:xfrm>
+            <a:off x="927214" y="1112412"/>
+            <a:ext cx="4862609" cy="2431305"/>
+          </a:xfrm>
+          <a:prstGeom prst="rect">
+            <a:avLst/>
+          </a:prstGeom>
+        </p:spPr>
+      </p:pic>
+      <p:pic>
+        <p:nvPicPr>
+          <p:cNvPr id="3" name="Picture 2">
+            <a:extLst>
+              <a:ext uri="{FF2B5EF4-FFF2-40B4-BE49-F238E27FC236}">
+                <a16:creationId xmlns:a16="http://schemas.microsoft.com/office/drawing/2014/main" id="{AC8467D1-DA5B-19A6-EB4A-9CDBE44697D8}"/>
+              </a:ext>
+            </a:extLst>
+          </p:cNvPr>
+          <p:cNvPicPr>
+            <a:picLocks noChangeAspect="1"/>
+          </p:cNvPicPr>
+          <p:nvPr/>
+        </p:nvPicPr>
+        <p:blipFill>
+          <a:blip r:embed="rId4"/>
+          <a:stretch>
+            <a:fillRect/>
+          </a:stretch>
+        </p:blipFill>
+        <p:spPr>
+          <a:xfrm>
+            <a:off x="6284531" y="1137542"/>
+            <a:ext cx="3480199" cy="2175125"/>
+          </a:xfrm>
+          <a:prstGeom prst="rect">
+            <a:avLst/>
+          </a:prstGeom>
+        </p:spPr>
+      </p:pic>
+    </p:spTree>
+    <p:extLst>
+      <p:ext uri="{BB962C8B-B14F-4D97-AF65-F5344CB8AC3E}">
+        <p14:creationId xmlns:p14="http://schemas.microsoft.com/office/powerpoint/2010/main" val="4207203520"/>
+      </p:ext>
+    </p:extLst>
+  </p:cSld>
+  <p:clrMapOvr>
+    <a:masterClrMapping/>
+  </p:clrMapOvr>
+</p:sld>
+</file>
+
+<file path=ppt/slides/slide7.xml><?xml version="1.0" encoding="utf-8"?>
+<p:sld xmlns:a="http://schemas.openxmlformats.org/drawingml/2006/main" xmlns:r="http://schemas.openxmlformats.org/officeDocument/2006/relationships" xmlns:p="http://schemas.openxmlformats.org/presentationml/2006/main">
+  <p:cSld>
+    <p:spTree>
+      <p:nvGrpSpPr>
+        <p:cNvPr id="1" name="">
+          <a:extLst>
+            <a:ext uri="{FF2B5EF4-FFF2-40B4-BE49-F238E27FC236}">
+              <a16:creationId xmlns:a16="http://schemas.microsoft.com/office/drawing/2014/main" id="{8B527AD0-17E2-E6BE-E08F-4912A0E2B045}"/>
+            </a:ext>
+          </a:extLst>
+        </p:cNvPr>
+        <p:cNvGrpSpPr/>
+        <p:nvPr/>
+      </p:nvGrpSpPr>
+      <p:grpSpPr>
+        <a:xfrm>
+          <a:off x="0" y="0"/>
+          <a:ext cx="0" cy="0"/>
+          <a:chOff x="0" y="0"/>
+          <a:chExt cx="0" cy="0"/>
+        </a:xfrm>
+      </p:grpSpPr>
+      <p:sp>
+        <p:nvSpPr>
+          <p:cNvPr id="6" name="TextBox 5">
+            <a:extLst>
+              <a:ext uri="{FF2B5EF4-FFF2-40B4-BE49-F238E27FC236}">
+                <a16:creationId xmlns:a16="http://schemas.microsoft.com/office/drawing/2014/main" id="{91968A87-C860-F3B8-2279-98F31EC9314F}"/>
+              </a:ext>
+            </a:extLst>
+          </p:cNvPr>
+          <p:cNvSpPr txBox="1"/>
+          <p:nvPr/>
+        </p:nvSpPr>
+        <p:spPr>
+          <a:xfrm>
+            <a:off x="4068681" y="3940508"/>
+            <a:ext cx="1960793" cy="369332"/>
+          </a:xfrm>
+          <a:prstGeom prst="rect">
+            <a:avLst/>
+          </a:prstGeom>
+          <a:noFill/>
+        </p:spPr>
+        <p:txBody>
+          <a:bodyPr wrap="none" rtlCol="0">
+            <a:spAutoFit/>
+          </a:bodyPr>
+          <a:lstStyle/>
+          <a:p>
+            <a:r>
+              <a:rPr lang="en-US" b="1" dirty="0">
+                <a:latin typeface="Roboto" panose="02000000000000000000" pitchFamily="2" charset="0"/>
+                <a:ea typeface="Roboto" panose="02000000000000000000" pitchFamily="2" charset="0"/>
+              </a:rPr>
+              <a:t>Palmer Penguins</a:t>
+            </a:r>
+          </a:p>
+        </p:txBody>
+      </p:sp>
+      <p:sp>
+        <p:nvSpPr>
+          <p:cNvPr id="8" name="TextBox 7">
+            <a:extLst>
+              <a:ext uri="{FF2B5EF4-FFF2-40B4-BE49-F238E27FC236}">
+                <a16:creationId xmlns:a16="http://schemas.microsoft.com/office/drawing/2014/main" id="{DB2AAD04-1FC6-A425-F54E-0B33B68C474D}"/>
+              </a:ext>
+            </a:extLst>
+          </p:cNvPr>
+          <p:cNvSpPr txBox="1"/>
+          <p:nvPr/>
+        </p:nvSpPr>
+        <p:spPr>
+          <a:xfrm>
+            <a:off x="2442547" y="3940508"/>
+            <a:ext cx="340158" cy="369332"/>
+          </a:xfrm>
+          <a:prstGeom prst="rect">
+            <a:avLst/>
+          </a:prstGeom>
+          <a:noFill/>
+        </p:spPr>
+        <p:txBody>
+          <a:bodyPr wrap="none" rtlCol="0">
+            <a:spAutoFit/>
+          </a:bodyPr>
+          <a:lstStyle/>
+          <a:p>
+            <a:r>
+              <a:rPr lang="en-US" b="1" dirty="0">
+                <a:latin typeface="Roboto" panose="02000000000000000000" pitchFamily="2" charset="0"/>
+                <a:ea typeface="Roboto" panose="02000000000000000000" pitchFamily="2" charset="0"/>
+              </a:rPr>
+              <a:t>C</a:t>
+            </a:r>
+          </a:p>
+        </p:txBody>
+      </p:sp>
+      <p:sp>
+        <p:nvSpPr>
+          <p:cNvPr id="17" name="TextBox 16">
+            <a:extLst>
+              <a:ext uri="{FF2B5EF4-FFF2-40B4-BE49-F238E27FC236}">
+                <a16:creationId xmlns:a16="http://schemas.microsoft.com/office/drawing/2014/main" id="{93642133-1407-37E8-5B90-7B150ECDDA1D}"/>
+              </a:ext>
+            </a:extLst>
+          </p:cNvPr>
+          <p:cNvSpPr txBox="1"/>
+          <p:nvPr/>
+        </p:nvSpPr>
+        <p:spPr>
+          <a:xfrm>
+            <a:off x="3417362" y="733972"/>
+            <a:ext cx="516488" cy="369332"/>
+          </a:xfrm>
+          <a:prstGeom prst="rect">
+            <a:avLst/>
+          </a:prstGeom>
+          <a:noFill/>
+        </p:spPr>
+        <p:txBody>
+          <a:bodyPr wrap="none" rtlCol="0">
+            <a:spAutoFit/>
+          </a:bodyPr>
+          <a:lstStyle/>
+          <a:p>
+            <a:r>
+              <a:rPr lang="en-US" b="1" dirty="0">
+                <a:latin typeface="Roboto" panose="02000000000000000000" pitchFamily="2" charset="0"/>
+                <a:ea typeface="Roboto" panose="02000000000000000000" pitchFamily="2" charset="0"/>
+              </a:rPr>
+              <a:t>Iris</a:t>
+            </a:r>
+          </a:p>
+        </p:txBody>
+      </p:sp>
+      <p:sp>
+        <p:nvSpPr>
+          <p:cNvPr id="25" name="TextBox 24">
+            <a:extLst>
+              <a:ext uri="{FF2B5EF4-FFF2-40B4-BE49-F238E27FC236}">
+                <a16:creationId xmlns:a16="http://schemas.microsoft.com/office/drawing/2014/main" id="{7A754B28-C455-923B-EF6F-5E694F4FDD6A}"/>
+              </a:ext>
+            </a:extLst>
+          </p:cNvPr>
+          <p:cNvSpPr txBox="1"/>
+          <p:nvPr/>
+        </p:nvSpPr>
+        <p:spPr>
+          <a:xfrm>
+            <a:off x="7395641" y="733972"/>
+            <a:ext cx="901209" cy="369332"/>
+          </a:xfrm>
+          <a:prstGeom prst="rect">
+            <a:avLst/>
+          </a:prstGeom>
+          <a:noFill/>
+        </p:spPr>
+        <p:txBody>
+          <a:bodyPr wrap="none" rtlCol="0">
+            <a:spAutoFit/>
+          </a:bodyPr>
+          <a:lstStyle/>
+          <a:p>
+            <a:r>
+              <a:rPr lang="en-US" b="1" dirty="0">
+                <a:latin typeface="Roboto" panose="02000000000000000000" pitchFamily="2" charset="0"/>
+                <a:ea typeface="Roboto" panose="02000000000000000000" pitchFamily="2" charset="0"/>
+              </a:rPr>
+              <a:t>Titanic</a:t>
+            </a:r>
+          </a:p>
+        </p:txBody>
+      </p:sp>
+      <p:sp>
+        <p:nvSpPr>
+          <p:cNvPr id="28" name="TextBox 27">
+            <a:extLst>
+              <a:ext uri="{FF2B5EF4-FFF2-40B4-BE49-F238E27FC236}">
+                <a16:creationId xmlns:a16="http://schemas.microsoft.com/office/drawing/2014/main" id="{24B6940D-4263-272E-A7C8-46FCFEBA37F5}"/>
+              </a:ext>
+            </a:extLst>
+          </p:cNvPr>
+          <p:cNvSpPr txBox="1"/>
+          <p:nvPr/>
+        </p:nvSpPr>
+        <p:spPr>
+          <a:xfrm>
+            <a:off x="6488639" y="705979"/>
+            <a:ext cx="340158" cy="369332"/>
+          </a:xfrm>
+          <a:prstGeom prst="rect">
+            <a:avLst/>
+          </a:prstGeom>
+          <a:noFill/>
+        </p:spPr>
+        <p:txBody>
+          <a:bodyPr wrap="none" rtlCol="0">
+            <a:spAutoFit/>
+          </a:bodyPr>
+          <a:lstStyle/>
+          <a:p>
+            <a:r>
+              <a:rPr lang="en-US" b="1" dirty="0">
+                <a:latin typeface="Roboto" panose="02000000000000000000" pitchFamily="2" charset="0"/>
+                <a:ea typeface="Roboto" panose="02000000000000000000" pitchFamily="2" charset="0"/>
+              </a:rPr>
+              <a:t>B</a:t>
+            </a:r>
+          </a:p>
+        </p:txBody>
+      </p:sp>
+      <p:sp>
+        <p:nvSpPr>
+          <p:cNvPr id="7" name="TextBox 6">
+            <a:extLst>
+              <a:ext uri="{FF2B5EF4-FFF2-40B4-BE49-F238E27FC236}">
+                <a16:creationId xmlns:a16="http://schemas.microsoft.com/office/drawing/2014/main" id="{8BB7B518-1790-BC68-C9A8-8A1FCEB36755}"/>
+              </a:ext>
+            </a:extLst>
+          </p:cNvPr>
+          <p:cNvSpPr txBox="1"/>
+          <p:nvPr/>
+        </p:nvSpPr>
+        <p:spPr>
+          <a:xfrm>
+            <a:off x="927594" y="705979"/>
+            <a:ext cx="340158" cy="369332"/>
+          </a:xfrm>
+          <a:prstGeom prst="rect">
+            <a:avLst/>
+          </a:prstGeom>
+          <a:noFill/>
+        </p:spPr>
+        <p:txBody>
+          <a:bodyPr wrap="none" rtlCol="0">
+            <a:spAutoFit/>
+          </a:bodyPr>
+          <a:lstStyle/>
+          <a:p>
+            <a:r>
+              <a:rPr lang="en-US" b="1" dirty="0">
+                <a:latin typeface="Roboto" panose="02000000000000000000" pitchFamily="2" charset="0"/>
+                <a:ea typeface="Roboto" panose="02000000000000000000" pitchFamily="2" charset="0"/>
+              </a:rPr>
+              <a:t>A</a:t>
+            </a:r>
+          </a:p>
+        </p:txBody>
+      </p:sp>
+      <p:pic>
+        <p:nvPicPr>
+          <p:cNvPr id="26" name="Picture 25">
+            <a:extLst>
+              <a:ext uri="{FF2B5EF4-FFF2-40B4-BE49-F238E27FC236}">
+                <a16:creationId xmlns:a16="http://schemas.microsoft.com/office/drawing/2014/main" id="{2F4B43C5-01D2-2DFA-F512-81D56126B149}"/>
+              </a:ext>
+            </a:extLst>
+          </p:cNvPr>
+          <p:cNvPicPr>
+            <a:picLocks noChangeAspect="1"/>
+          </p:cNvPicPr>
+          <p:nvPr/>
+        </p:nvPicPr>
+        <p:blipFill>
+          <a:blip r:embed="rId2"/>
+          <a:stretch>
+            <a:fillRect/>
+          </a:stretch>
+        </p:blipFill>
+        <p:spPr>
+          <a:xfrm>
+            <a:off x="927214" y="1112412"/>
+            <a:ext cx="4862609" cy="2431305"/>
+          </a:xfrm>
+          <a:prstGeom prst="rect">
+            <a:avLst/>
+          </a:prstGeom>
+        </p:spPr>
+      </p:pic>
+      <p:pic>
+        <p:nvPicPr>
+          <p:cNvPr id="3" name="Picture 2">
+            <a:extLst>
+              <a:ext uri="{FF2B5EF4-FFF2-40B4-BE49-F238E27FC236}">
+                <a16:creationId xmlns:a16="http://schemas.microsoft.com/office/drawing/2014/main" id="{0E5A96AA-57A7-104E-B2D4-668AE7BA4E8D}"/>
+              </a:ext>
+            </a:extLst>
+          </p:cNvPr>
+          <p:cNvPicPr>
+            <a:picLocks noChangeAspect="1"/>
+          </p:cNvPicPr>
+          <p:nvPr/>
+        </p:nvPicPr>
+        <p:blipFill>
+          <a:blip r:embed="rId3"/>
+          <a:stretch>
+            <a:fillRect/>
+          </a:stretch>
+        </p:blipFill>
+        <p:spPr>
+          <a:xfrm>
+            <a:off x="6284531" y="1137542"/>
+            <a:ext cx="3480199" cy="2175125"/>
+          </a:xfrm>
+          <a:prstGeom prst="rect">
+            <a:avLst/>
+          </a:prstGeom>
+        </p:spPr>
+      </p:pic>
+      <p:pic>
+        <p:nvPicPr>
+          <p:cNvPr id="4" name="Picture 3">
+            <a:extLst>
+              <a:ext uri="{FF2B5EF4-FFF2-40B4-BE49-F238E27FC236}">
+                <a16:creationId xmlns:a16="http://schemas.microsoft.com/office/drawing/2014/main" id="{002B6136-1196-F7A0-F8E4-AC1C4483C3C4}"/>
+              </a:ext>
+            </a:extLst>
+          </p:cNvPr>
+          <p:cNvPicPr>
+            <a:picLocks noChangeAspect="1"/>
+          </p:cNvPicPr>
+          <p:nvPr/>
+        </p:nvPicPr>
+        <p:blipFill>
+          <a:blip r:embed="rId4"/>
+          <a:stretch>
+            <a:fillRect/>
+          </a:stretch>
+        </p:blipFill>
+        <p:spPr>
+          <a:xfrm>
+            <a:off x="1427241" y="4320473"/>
+            <a:ext cx="7772400" cy="1943100"/>
+          </a:xfrm>
+          <a:prstGeom prst="rect">
+            <a:avLst/>
+          </a:prstGeom>
+        </p:spPr>
+      </p:pic>
+    </p:spTree>
+    <p:extLst>
+      <p:ext uri="{BB962C8B-B14F-4D97-AF65-F5344CB8AC3E}">
+        <p14:creationId xmlns:p14="http://schemas.microsoft.com/office/powerpoint/2010/main" val="2755252575"/>
+      </p:ext>
+    </p:extLst>
+  </p:cSld>
+  <p:clrMapOvr>
+    <a:masterClrMapping/>
+  </p:clrMapOvr>
+</p:sld>
+</file>
+
+<file path=ppt/slides/slide8.xml><?xml version="1.0" encoding="utf-8"?>
+<p:sld xmlns:a="http://schemas.openxmlformats.org/drawingml/2006/main" xmlns:r="http://schemas.openxmlformats.org/officeDocument/2006/relationships" xmlns:p="http://schemas.openxmlformats.org/presentationml/2006/main">
+  <p:cSld>
+    <p:spTree>
+      <p:nvGrpSpPr>
+        <p:cNvPr id="1" name=""/>
+        <p:cNvGrpSpPr/>
+        <p:nvPr/>
+      </p:nvGrpSpPr>
+      <p:grpSpPr>
+        <a:xfrm>
+          <a:off x="0" y="0"/>
+          <a:ext cx="0" cy="0"/>
+          <a:chOff x="0" y="0"/>
+          <a:chExt cx="0" cy="0"/>
+        </a:xfrm>
+      </p:grpSpPr>
+      <p:graphicFrame>
+        <p:nvGraphicFramePr>
+          <p:cNvPr id="4" name="Table 3">
+            <a:extLst>
+              <a:ext uri="{FF2B5EF4-FFF2-40B4-BE49-F238E27FC236}">
+                <a16:creationId xmlns:a16="http://schemas.microsoft.com/office/drawing/2014/main" id="{9109212E-3422-58C8-D0E2-5806AAF52250}"/>
+              </a:ext>
+            </a:extLst>
+          </p:cNvPr>
+          <p:cNvGraphicFramePr>
+            <a:graphicFrameLocks noGrp="1"/>
+          </p:cNvGraphicFramePr>
+          <p:nvPr>
+            <p:extLst>
+              <p:ext uri="{D42A27DB-BD31-4B8C-83A1-F6EECF244321}">
+                <p14:modId xmlns:p14="http://schemas.microsoft.com/office/powerpoint/2010/main" val="2927103327"/>
+              </p:ext>
+            </p:extLst>
+          </p:nvPr>
+        </p:nvGraphicFramePr>
+        <p:xfrm>
+          <a:off x="-1648691" y="152400"/>
+          <a:ext cx="10598727" cy="6571763"/>
+        </p:xfrm>
+        <a:graphic>
+          <a:graphicData uri="http://schemas.openxmlformats.org/drawingml/2006/table">
+            <a:tbl>
+              <a:tblPr firstRow="1" bandRow="1">
+                <a:tableStyleId>{5940675A-B579-460E-94D1-54222C63F5DA}</a:tableStyleId>
+              </a:tblPr>
+              <a:tblGrid>
+                <a:gridCol w="3643745">
+                  <a:extLst>
+                    <a:ext uri="{9D8B030D-6E8A-4147-A177-3AD203B41FA5}">
+                      <a16:colId xmlns:a16="http://schemas.microsoft.com/office/drawing/2014/main" val="951092816"/>
+                    </a:ext>
+                  </a:extLst>
+                </a:gridCol>
+                <a:gridCol w="926494">
+                  <a:extLst>
+                    <a:ext uri="{9D8B030D-6E8A-4147-A177-3AD203B41FA5}">
+                      <a16:colId xmlns:a16="http://schemas.microsoft.com/office/drawing/2014/main" val="806391585"/>
+                    </a:ext>
+                  </a:extLst>
+                </a:gridCol>
+                <a:gridCol w="1955278">
+                  <a:extLst>
+                    <a:ext uri="{9D8B030D-6E8A-4147-A177-3AD203B41FA5}">
+                      <a16:colId xmlns:a16="http://schemas.microsoft.com/office/drawing/2014/main" val="4084836005"/>
+                    </a:ext>
+                  </a:extLst>
+                </a:gridCol>
+                <a:gridCol w="1533273">
+                  <a:extLst>
+                    <a:ext uri="{9D8B030D-6E8A-4147-A177-3AD203B41FA5}">
+                      <a16:colId xmlns:a16="http://schemas.microsoft.com/office/drawing/2014/main" val="4253426059"/>
+                    </a:ext>
+                  </a:extLst>
+                </a:gridCol>
+                <a:gridCol w="1181606">
+                  <a:extLst>
+                    <a:ext uri="{9D8B030D-6E8A-4147-A177-3AD203B41FA5}">
+                      <a16:colId xmlns:a16="http://schemas.microsoft.com/office/drawing/2014/main" val="3997728873"/>
+                    </a:ext>
+                  </a:extLst>
+                </a:gridCol>
+                <a:gridCol w="1358331">
+                  <a:extLst>
+                    <a:ext uri="{9D8B030D-6E8A-4147-A177-3AD203B41FA5}">
+                      <a16:colId xmlns:a16="http://schemas.microsoft.com/office/drawing/2014/main" val="3829254136"/>
+                    </a:ext>
+                  </a:extLst>
+                </a:gridCol>
+              </a:tblGrid>
+              <a:tr h="909163">
+                <a:tc>
+                  <a:txBody>
+                    <a:bodyPr/>
+                    <a:lstStyle/>
+                    <a:p>
+                      <a:pPr algn="ctr"/>
+                      <a:r>
+                        <a:rPr lang="en-US" b="1" dirty="0"/>
+                        <a:t>Feature</a:t>
+                      </a:r>
+                    </a:p>
+                  </a:txBody>
+                  <a:tcPr anchor="ctr"/>
+                </a:tc>
+                <a:tc>
+                  <a:txBody>
+                    <a:bodyPr/>
+                    <a:lstStyle/>
+                    <a:p>
+                      <a:pPr algn="ctr"/>
+                      <a:r>
+                        <a:rPr lang="en-US" b="1" dirty="0"/>
+                        <a:t>gg1d</a:t>
+                      </a:r>
+                    </a:p>
+                  </a:txBody>
+                  <a:tcPr anchor="ctr"/>
+                </a:tc>
+                <a:tc>
+                  <a:txBody>
+                    <a:bodyPr/>
+                    <a:lstStyle/>
+                    <a:p>
+                      <a:pPr algn="ctr"/>
+                      <a:r>
+                        <a:rPr lang="en-US" b="1" dirty="0"/>
+                        <a:t>Complex</a:t>
+                      </a:r>
+                    </a:p>
+                    <a:p>
+                      <a:pPr algn="ctr"/>
+                      <a:r>
+                        <a:rPr lang="en-US" b="1" dirty="0"/>
+                        <a:t>Heatmap</a:t>
+                      </a:r>
+                    </a:p>
+                  </a:txBody>
+                  <a:tcPr anchor="ctr"/>
+                </a:tc>
+                <a:tc>
+                  <a:txBody>
+                    <a:bodyPr/>
+                    <a:lstStyle/>
+                    <a:p>
+                      <a:pPr algn="ctr"/>
+                      <a:r>
+                        <a:rPr lang="en-US" b="1" dirty="0"/>
+                        <a:t>Data</a:t>
+                      </a:r>
+                    </a:p>
+                    <a:p>
+                      <a:pPr algn="ctr"/>
+                      <a:r>
+                        <a:rPr lang="en-US" b="1" dirty="0"/>
+                        <a:t>Explorer</a:t>
+                      </a:r>
+                    </a:p>
+                  </a:txBody>
+                  <a:tcPr anchor="ctr"/>
+                </a:tc>
+                <a:tc>
+                  <a:txBody>
+                    <a:bodyPr/>
+                    <a:lstStyle/>
+                    <a:p>
+                      <a:pPr algn="ctr"/>
+                      <a:r>
+                        <a:rPr lang="en-US" b="1" dirty="0" err="1"/>
+                        <a:t>skimr</a:t>
+                      </a:r>
+                      <a:endParaRPr lang="en-US" b="1" dirty="0"/>
+                    </a:p>
+                  </a:txBody>
+                  <a:tcPr anchor="ctr"/>
+                </a:tc>
+                <a:tc>
+                  <a:txBody>
+                    <a:bodyPr/>
+                    <a:lstStyle/>
+                    <a:p>
+                      <a:pPr algn="ctr"/>
+                      <a:r>
+                        <a:rPr lang="en-US" b="1" dirty="0" err="1"/>
+                        <a:t>GGally</a:t>
+                      </a:r>
+                      <a:endParaRPr lang="en-US" b="1" dirty="0"/>
+                    </a:p>
+                  </a:txBody>
+                  <a:tcPr anchor="ctr"/>
+                </a:tc>
+                <a:extLst>
+                  <a:ext uri="{0D108BD9-81ED-4DB2-BD59-A6C34878D82A}">
+                    <a16:rowId xmlns:a16="http://schemas.microsoft.com/office/drawing/2014/main" val="3500340894"/>
+                  </a:ext>
+                </a:extLst>
+              </a:tr>
+              <a:tr h="707825">
+                <a:tc>
+                  <a:txBody>
+                    <a:bodyPr/>
+                    <a:lstStyle/>
+                    <a:p>
+                      <a:pPr algn="ctr"/>
+                      <a:r>
+                        <a:rPr lang="en-US" dirty="0"/>
+                        <a:t>Automatic Plot Generation</a:t>
+                      </a:r>
+                    </a:p>
+                  </a:txBody>
+                  <a:tcPr anchor="ctr"/>
+                </a:tc>
+                <a:tc>
+                  <a:txBody>
+                    <a:bodyPr/>
+                    <a:lstStyle/>
+                    <a:p>
+                      <a:pPr algn="ctr"/>
+                      <a:r>
+                        <a:rPr lang="en-US" dirty="0"/>
+                        <a:t>✔️</a:t>
+                      </a:r>
+                    </a:p>
+                  </a:txBody>
+                  <a:tcPr anchor="ctr">
+                    <a:solidFill>
+                      <a:schemeClr val="accent6">
+                        <a:lumMod val="40000"/>
+                        <a:lumOff val="60000"/>
+                      </a:schemeClr>
+                    </a:solidFill>
+                  </a:tcPr>
+                </a:tc>
+                <a:tc>
+                  <a:txBody>
+                    <a:bodyPr/>
+                    <a:lstStyle/>
+                    <a:p>
+                      <a:pPr marL="0" marR="0" lvl="0" indent="0" algn="ctr" defTabSz="914400" rtl="0" eaLnBrk="1" fontAlgn="auto" latinLnBrk="0" hangingPunct="1">
+                        <a:lnSpc>
+                          <a:spcPct val="100000"/>
+                        </a:lnSpc>
+                        <a:spcBef>
+                          <a:spcPts val="0"/>
+                        </a:spcBef>
+                        <a:spcAft>
+                          <a:spcPts val="0"/>
+                        </a:spcAft>
+                        <a:buClrTx/>
+                        <a:buSzTx/>
+                        <a:buFontTx/>
+                        <a:buNone/>
+                        <a:tabLst/>
+                        <a:defRPr/>
+                      </a:pPr>
+                      <a:r>
+                        <a:rPr lang="en-US" dirty="0"/>
+                        <a:t>❌</a:t>
+                      </a:r>
+                    </a:p>
+                  </a:txBody>
+                  <a:tcPr anchor="ctr"/>
+                </a:tc>
+                <a:tc>
+                  <a:txBody>
+                    <a:bodyPr/>
+                    <a:lstStyle/>
+                    <a:p>
+                      <a:pPr marL="0" marR="0" lvl="0" indent="0" algn="ctr" defTabSz="914400" rtl="0" eaLnBrk="1" fontAlgn="auto" latinLnBrk="0" hangingPunct="1">
+                        <a:lnSpc>
+                          <a:spcPct val="100000"/>
+                        </a:lnSpc>
+                        <a:spcBef>
+                          <a:spcPts val="0"/>
+                        </a:spcBef>
+                        <a:spcAft>
+                          <a:spcPts val="0"/>
+                        </a:spcAft>
+                        <a:buClrTx/>
+                        <a:buSzTx/>
+                        <a:buFontTx/>
+                        <a:buNone/>
+                        <a:tabLst/>
+                        <a:defRPr/>
+                      </a:pPr>
+                      <a:r>
+                        <a:rPr lang="en-US" dirty="0"/>
+                        <a:t>✔️</a:t>
+                      </a:r>
+                    </a:p>
+                  </a:txBody>
+                  <a:tcPr anchor="ctr">
+                    <a:solidFill>
+                      <a:schemeClr val="accent6">
+                        <a:lumMod val="40000"/>
+                        <a:lumOff val="60000"/>
+                      </a:schemeClr>
+                    </a:solidFill>
+                  </a:tcPr>
+                </a:tc>
+                <a:tc>
+                  <a:txBody>
+                    <a:bodyPr/>
+                    <a:lstStyle/>
+                    <a:p>
+                      <a:pPr algn="ctr"/>
+                      <a:r>
+                        <a:rPr lang="en-US" dirty="0"/>
+                        <a:t>✔️</a:t>
+                      </a:r>
+                    </a:p>
+                  </a:txBody>
+                  <a:tcPr anchor="ctr">
+                    <a:solidFill>
+                      <a:schemeClr val="accent6">
+                        <a:lumMod val="40000"/>
+                        <a:lumOff val="60000"/>
+                      </a:schemeClr>
+                    </a:solidFill>
+                  </a:tcPr>
+                </a:tc>
+                <a:tc>
+                  <a:txBody>
+                    <a:bodyPr/>
+                    <a:lstStyle/>
+                    <a:p>
+                      <a:pPr algn="ctr"/>
+                      <a:r>
+                        <a:rPr lang="en-US" dirty="0"/>
+                        <a:t>✔️</a:t>
+                      </a:r>
+                    </a:p>
+                  </a:txBody>
+                  <a:tcPr anchor="ctr">
+                    <a:solidFill>
+                      <a:schemeClr val="accent6">
+                        <a:lumMod val="40000"/>
+                        <a:lumOff val="60000"/>
+                      </a:schemeClr>
+                    </a:solidFill>
+                  </a:tcPr>
+                </a:tc>
+                <a:extLst>
+                  <a:ext uri="{0D108BD9-81ED-4DB2-BD59-A6C34878D82A}">
+                    <a16:rowId xmlns:a16="http://schemas.microsoft.com/office/drawing/2014/main" val="620829127"/>
+                  </a:ext>
+                </a:extLst>
+              </a:tr>
+              <a:tr h="707825">
+                <a:tc>
+                  <a:txBody>
+                    <a:bodyPr/>
+                    <a:lstStyle/>
+                    <a:p>
+                      <a:pPr marL="0" marR="0" lvl="0" indent="0" algn="ctr" defTabSz="914400" rtl="0" eaLnBrk="1" fontAlgn="auto" latinLnBrk="0" hangingPunct="1">
+                        <a:lnSpc>
+                          <a:spcPct val="100000"/>
+                        </a:lnSpc>
+                        <a:spcBef>
+                          <a:spcPts val="0"/>
+                        </a:spcBef>
+                        <a:spcAft>
+                          <a:spcPts val="0"/>
+                        </a:spcAft>
+                        <a:buClrTx/>
+                        <a:buSzTx/>
+                        <a:buFontTx/>
+                        <a:buNone/>
+                        <a:tabLst/>
+                        <a:defRPr/>
+                      </a:pPr>
+                      <a:r>
+                        <a:rPr lang="en-US" dirty="0"/>
+                        <a:t>Automatic plot selection by variable type</a:t>
+                      </a:r>
+                    </a:p>
+                  </a:txBody>
+                  <a:tcPr anchor="ctr"/>
+                </a:tc>
+                <a:tc>
+                  <a:txBody>
+                    <a:bodyPr/>
+                    <a:lstStyle/>
+                    <a:p>
+                      <a:pPr marL="0" marR="0" lvl="0" indent="0" algn="ctr" defTabSz="914400" rtl="0" eaLnBrk="1" fontAlgn="auto" latinLnBrk="0" hangingPunct="1">
+                        <a:lnSpc>
+                          <a:spcPct val="100000"/>
+                        </a:lnSpc>
+                        <a:spcBef>
+                          <a:spcPts val="0"/>
+                        </a:spcBef>
+                        <a:spcAft>
+                          <a:spcPts val="0"/>
+                        </a:spcAft>
+                        <a:buClrTx/>
+                        <a:buSzTx/>
+                        <a:buFontTx/>
+                        <a:buNone/>
+                        <a:tabLst/>
+                        <a:defRPr/>
+                      </a:pPr>
+                      <a:r>
+                        <a:rPr lang="en-US" dirty="0"/>
+                        <a:t>✔️</a:t>
+                      </a:r>
+                    </a:p>
+                  </a:txBody>
+                  <a:tcPr anchor="ctr">
+                    <a:solidFill>
+                      <a:schemeClr val="accent6">
+                        <a:lumMod val="40000"/>
+                        <a:lumOff val="60000"/>
+                      </a:schemeClr>
+                    </a:solidFill>
+                  </a:tcPr>
+                </a:tc>
+                <a:tc>
+                  <a:txBody>
+                    <a:bodyPr/>
+                    <a:lstStyle/>
+                    <a:p>
+                      <a:pPr marL="0" marR="0" lvl="0" indent="0" algn="ctr" defTabSz="914400" rtl="0" eaLnBrk="1" fontAlgn="auto" latinLnBrk="0" hangingPunct="1">
+                        <a:lnSpc>
+                          <a:spcPct val="100000"/>
+                        </a:lnSpc>
+                        <a:spcBef>
+                          <a:spcPts val="0"/>
+                        </a:spcBef>
+                        <a:spcAft>
+                          <a:spcPts val="0"/>
+                        </a:spcAft>
+                        <a:buClrTx/>
+                        <a:buSzTx/>
+                        <a:buFontTx/>
+                        <a:buNone/>
+                        <a:tabLst/>
+                        <a:defRPr/>
+                      </a:pPr>
+                      <a:r>
+                        <a:rPr lang="en-US" dirty="0"/>
+                        <a:t>❌</a:t>
+                      </a:r>
+                    </a:p>
+                  </a:txBody>
+                  <a:tcPr anchor="ctr"/>
+                </a:tc>
+                <a:tc>
+                  <a:txBody>
+                    <a:bodyPr/>
+                    <a:lstStyle/>
+                    <a:p>
+                      <a:pPr algn="ctr"/>
+                      <a:r>
+                        <a:rPr lang="en-US" dirty="0"/>
+                        <a:t>✔️</a:t>
+                      </a:r>
+                    </a:p>
+                  </a:txBody>
+                  <a:tcPr anchor="ctr">
+                    <a:solidFill>
+                      <a:schemeClr val="accent6">
+                        <a:lumMod val="40000"/>
+                        <a:lumOff val="60000"/>
+                      </a:schemeClr>
+                    </a:solidFill>
+                  </a:tcPr>
+                </a:tc>
+                <a:tc>
+                  <a:txBody>
+                    <a:bodyPr/>
+                    <a:lstStyle/>
+                    <a:p>
+                      <a:pPr algn="ctr"/>
+                      <a:r>
+                        <a:rPr lang="en-US" dirty="0"/>
+                        <a:t>❌</a:t>
+                      </a:r>
+                    </a:p>
+                  </a:txBody>
+                  <a:tcPr anchor="ctr"/>
+                </a:tc>
+                <a:tc>
+                  <a:txBody>
+                    <a:bodyPr/>
+                    <a:lstStyle/>
+                    <a:p>
+                      <a:pPr marL="0" marR="0" lvl="0" indent="0" algn="ctr" defTabSz="914400" rtl="0" eaLnBrk="1" fontAlgn="auto" latinLnBrk="0" hangingPunct="1">
+                        <a:lnSpc>
+                          <a:spcPct val="100000"/>
+                        </a:lnSpc>
+                        <a:spcBef>
+                          <a:spcPts val="0"/>
+                        </a:spcBef>
+                        <a:spcAft>
+                          <a:spcPts val="0"/>
+                        </a:spcAft>
+                        <a:buClrTx/>
+                        <a:buSzTx/>
+                        <a:buFontTx/>
+                        <a:buNone/>
+                        <a:tabLst/>
+                        <a:defRPr/>
+                      </a:pPr>
+                      <a:r>
+                        <a:rPr lang="en-US" dirty="0"/>
+                        <a:t>✔️</a:t>
+                      </a:r>
+                    </a:p>
+                  </a:txBody>
+                  <a:tcPr anchor="ctr">
+                    <a:solidFill>
+                      <a:schemeClr val="accent6">
+                        <a:lumMod val="40000"/>
+                        <a:lumOff val="60000"/>
+                      </a:schemeClr>
+                    </a:solidFill>
+                  </a:tcPr>
+                </a:tc>
+                <a:extLst>
+                  <a:ext uri="{0D108BD9-81ED-4DB2-BD59-A6C34878D82A}">
+                    <a16:rowId xmlns:a16="http://schemas.microsoft.com/office/drawing/2014/main" val="1813374903"/>
+                  </a:ext>
+                </a:extLst>
+              </a:tr>
+              <a:tr h="707825">
+                <a:tc>
+                  <a:txBody>
+                    <a:bodyPr/>
+                    <a:lstStyle/>
+                    <a:p>
+                      <a:pPr algn="ctr"/>
+                      <a:r>
+                        <a:rPr lang="en-US" dirty="0"/>
+                        <a:t>Interactive </a:t>
+                      </a:r>
+                      <a:r>
+                        <a:rPr lang="en-US" dirty="0" err="1"/>
+                        <a:t>Visualisations</a:t>
+                      </a:r>
+                      <a:endParaRPr lang="en-US" dirty="0"/>
+                    </a:p>
+                  </a:txBody>
+                  <a:tcPr anchor="ctr"/>
+                </a:tc>
+                <a:tc>
+                  <a:txBody>
+                    <a:bodyPr/>
+                    <a:lstStyle/>
+                    <a:p>
+                      <a:pPr marL="0" marR="0" lvl="0" indent="0" algn="ctr" defTabSz="914400" rtl="0" eaLnBrk="1" fontAlgn="auto" latinLnBrk="0" hangingPunct="1">
+                        <a:lnSpc>
+                          <a:spcPct val="100000"/>
+                        </a:lnSpc>
+                        <a:spcBef>
+                          <a:spcPts val="0"/>
+                        </a:spcBef>
+                        <a:spcAft>
+                          <a:spcPts val="0"/>
+                        </a:spcAft>
+                        <a:buClrTx/>
+                        <a:buSzTx/>
+                        <a:buFontTx/>
+                        <a:buNone/>
+                        <a:tabLst/>
+                        <a:defRPr/>
+                      </a:pPr>
+                      <a:r>
+                        <a:rPr lang="en-US" dirty="0"/>
+                        <a:t>✔️</a:t>
+                      </a:r>
+                    </a:p>
+                  </a:txBody>
+                  <a:tcPr anchor="ctr">
+                    <a:solidFill>
+                      <a:schemeClr val="accent6">
+                        <a:lumMod val="40000"/>
+                        <a:lumOff val="60000"/>
+                      </a:schemeClr>
+                    </a:solidFill>
+                  </a:tcPr>
+                </a:tc>
+                <a:tc>
+                  <a:txBody>
+                    <a:bodyPr/>
+                    <a:lstStyle/>
+                    <a:p>
+                      <a:pPr algn="ctr"/>
+                      <a:r>
+                        <a:rPr lang="en-US" dirty="0"/>
+                        <a:t>❌</a:t>
+                      </a:r>
+                    </a:p>
+                  </a:txBody>
+                  <a:tcPr anchor="ctr"/>
+                </a:tc>
+                <a:tc>
+                  <a:txBody>
+                    <a:bodyPr/>
+                    <a:lstStyle/>
+                    <a:p>
+                      <a:pPr algn="ctr"/>
+                      <a:r>
+                        <a:rPr lang="en-US" dirty="0"/>
+                        <a:t>❌</a:t>
+                      </a:r>
+                    </a:p>
+                  </a:txBody>
+                  <a:tcPr anchor="ctr"/>
+                </a:tc>
+                <a:tc>
+                  <a:txBody>
+                    <a:bodyPr/>
+                    <a:lstStyle/>
+                    <a:p>
+                      <a:pPr algn="ctr"/>
+                      <a:r>
+                        <a:rPr lang="en-US" dirty="0"/>
+                        <a:t>❌</a:t>
+                      </a:r>
+                    </a:p>
+                  </a:txBody>
+                  <a:tcPr anchor="ctr"/>
+                </a:tc>
+                <a:tc>
+                  <a:txBody>
+                    <a:bodyPr/>
+                    <a:lstStyle/>
+                    <a:p>
+                      <a:pPr algn="ctr"/>
+                      <a:r>
+                        <a:rPr lang="en-US" dirty="0"/>
+                        <a:t>❌</a:t>
+                      </a:r>
+                    </a:p>
+                  </a:txBody>
+                  <a:tcPr anchor="ctr"/>
+                </a:tc>
+                <a:extLst>
+                  <a:ext uri="{0D108BD9-81ED-4DB2-BD59-A6C34878D82A}">
+                    <a16:rowId xmlns:a16="http://schemas.microsoft.com/office/drawing/2014/main" val="2865965129"/>
+                  </a:ext>
+                </a:extLst>
+              </a:tr>
+              <a:tr h="707825">
+                <a:tc>
+                  <a:txBody>
+                    <a:bodyPr/>
+                    <a:lstStyle/>
+                    <a:p>
+                      <a:pPr algn="ctr"/>
+                      <a:r>
+                        <a:rPr lang="en-US" dirty="0"/>
+                        <a:t>Supports cross-linking with other datasets</a:t>
+                      </a:r>
+                    </a:p>
+                  </a:txBody>
+                  <a:tcPr anchor="ctr"/>
+                </a:tc>
+                <a:tc>
+                  <a:txBody>
+                    <a:bodyPr/>
+                    <a:lstStyle/>
+                    <a:p>
+                      <a:pPr marL="0" marR="0" lvl="0" indent="0" algn="ctr" defTabSz="914400" rtl="0" eaLnBrk="1" fontAlgn="auto" latinLnBrk="0" hangingPunct="1">
+                        <a:lnSpc>
+                          <a:spcPct val="100000"/>
+                        </a:lnSpc>
+                        <a:spcBef>
+                          <a:spcPts val="0"/>
+                        </a:spcBef>
+                        <a:spcAft>
+                          <a:spcPts val="0"/>
+                        </a:spcAft>
+                        <a:buClrTx/>
+                        <a:buSzTx/>
+                        <a:buFontTx/>
+                        <a:buNone/>
+                        <a:tabLst/>
+                        <a:defRPr/>
+                      </a:pPr>
+                      <a:r>
+                        <a:rPr lang="en-US" dirty="0"/>
+                        <a:t>✔️</a:t>
+                      </a:r>
+                    </a:p>
+                    <a:p>
+                      <a:pPr marL="0" marR="0" lvl="0" indent="0" algn="ctr" defTabSz="914400" rtl="0" eaLnBrk="1" fontAlgn="auto" latinLnBrk="0" hangingPunct="1">
+                        <a:lnSpc>
+                          <a:spcPct val="100000"/>
+                        </a:lnSpc>
+                        <a:spcBef>
+                          <a:spcPts val="0"/>
+                        </a:spcBef>
+                        <a:spcAft>
+                          <a:spcPts val="0"/>
+                        </a:spcAft>
+                        <a:buClrTx/>
+                        <a:buSzTx/>
+                        <a:buFontTx/>
+                        <a:buNone/>
+                        <a:tabLst/>
+                        <a:defRPr/>
+                      </a:pPr>
+                      <a:endParaRPr lang="en-US" dirty="0"/>
+                    </a:p>
+                  </a:txBody>
+                  <a:tcPr anchor="ctr">
+                    <a:solidFill>
+                      <a:schemeClr val="accent6">
+                        <a:lumMod val="40000"/>
+                        <a:lumOff val="60000"/>
+                      </a:schemeClr>
+                    </a:solidFill>
+                  </a:tcPr>
+                </a:tc>
+                <a:tc>
+                  <a:txBody>
+                    <a:bodyPr/>
+                    <a:lstStyle/>
+                    <a:p>
+                      <a:pPr algn="ctr"/>
+                      <a:r>
+                        <a:rPr lang="en-US" dirty="0"/>
+                        <a:t>❌</a:t>
+                      </a:r>
+                    </a:p>
+                  </a:txBody>
+                  <a:tcPr anchor="ctr"/>
+                </a:tc>
+                <a:tc>
+                  <a:txBody>
+                    <a:bodyPr/>
+                    <a:lstStyle/>
+                    <a:p>
+                      <a:pPr algn="ctr"/>
+                      <a:r>
+                        <a:rPr lang="en-US" dirty="0"/>
+                        <a:t>❌</a:t>
+                      </a:r>
+                    </a:p>
+                  </a:txBody>
+                  <a:tcPr anchor="ctr"/>
+                </a:tc>
+                <a:tc>
+                  <a:txBody>
+                    <a:bodyPr/>
+                    <a:lstStyle/>
+                    <a:p>
+                      <a:pPr algn="ctr"/>
+                      <a:r>
+                        <a:rPr lang="en-US" dirty="0"/>
+                        <a:t>❌</a:t>
+                      </a:r>
+                    </a:p>
+                  </a:txBody>
+                  <a:tcPr anchor="ctr"/>
+                </a:tc>
+                <a:tc>
+                  <a:txBody>
+                    <a:bodyPr/>
+                    <a:lstStyle/>
+                    <a:p>
+                      <a:pPr algn="ctr"/>
+                      <a:r>
+                        <a:rPr lang="en-US" dirty="0"/>
+                        <a:t>❌</a:t>
+                      </a:r>
+                    </a:p>
+                  </a:txBody>
+                  <a:tcPr anchor="ctr"/>
+                </a:tc>
+                <a:extLst>
+                  <a:ext uri="{0D108BD9-81ED-4DB2-BD59-A6C34878D82A}">
+                    <a16:rowId xmlns:a16="http://schemas.microsoft.com/office/drawing/2014/main" val="1173413142"/>
+                  </a:ext>
+                </a:extLst>
+              </a:tr>
+              <a:tr h="707825">
+                <a:tc>
+                  <a:txBody>
+                    <a:bodyPr/>
+                    <a:lstStyle/>
+                    <a:p>
+                      <a:pPr algn="ctr"/>
+                      <a:r>
+                        <a:rPr lang="en-US" dirty="0"/>
+                        <a:t>Composable with Patchwork</a:t>
+                      </a:r>
+                    </a:p>
+                  </a:txBody>
+                  <a:tcPr anchor="ctr"/>
+                </a:tc>
+                <a:tc>
+                  <a:txBody>
+                    <a:bodyPr/>
+                    <a:lstStyle/>
+                    <a:p>
+                      <a:pPr marL="0" marR="0" lvl="0" indent="0" algn="ctr" defTabSz="914400" rtl="0" eaLnBrk="1" fontAlgn="auto" latinLnBrk="0" hangingPunct="1">
+                        <a:lnSpc>
+                          <a:spcPct val="100000"/>
+                        </a:lnSpc>
+                        <a:spcBef>
+                          <a:spcPts val="0"/>
+                        </a:spcBef>
+                        <a:spcAft>
+                          <a:spcPts val="0"/>
+                        </a:spcAft>
+                        <a:buClrTx/>
+                        <a:buSzTx/>
+                        <a:buFontTx/>
+                        <a:buNone/>
+                        <a:tabLst/>
+                        <a:defRPr/>
+                      </a:pPr>
+                      <a:r>
+                        <a:rPr lang="en-US" dirty="0"/>
+                        <a:t>✔️</a:t>
+                      </a:r>
+                    </a:p>
+                  </a:txBody>
+                  <a:tcPr anchor="ctr">
+                    <a:solidFill>
+                      <a:schemeClr val="accent6">
+                        <a:lumMod val="40000"/>
+                        <a:lumOff val="60000"/>
+                      </a:schemeClr>
+                    </a:solidFill>
+                  </a:tcPr>
+                </a:tc>
+                <a:tc>
+                  <a:txBody>
+                    <a:bodyPr/>
+                    <a:lstStyle/>
+                    <a:p>
+                      <a:pPr marL="0" marR="0" lvl="0" indent="0" algn="ctr" defTabSz="914400" rtl="0" eaLnBrk="1" fontAlgn="auto" latinLnBrk="0" hangingPunct="1">
+                        <a:lnSpc>
+                          <a:spcPct val="100000"/>
+                        </a:lnSpc>
+                        <a:spcBef>
+                          <a:spcPts val="0"/>
+                        </a:spcBef>
+                        <a:spcAft>
+                          <a:spcPts val="0"/>
+                        </a:spcAft>
+                        <a:buClrTx/>
+                        <a:buSzTx/>
+                        <a:buFontTx/>
+                        <a:buNone/>
+                        <a:tabLst/>
+                        <a:defRPr/>
+                      </a:pPr>
+                      <a:r>
+                        <a:rPr lang="en-US" dirty="0"/>
+                        <a:t>✔️</a:t>
+                      </a:r>
+                    </a:p>
+                  </a:txBody>
+                  <a:tcPr anchor="ctr">
+                    <a:solidFill>
+                      <a:schemeClr val="accent6">
+                        <a:lumMod val="40000"/>
+                        <a:lumOff val="60000"/>
+                      </a:schemeClr>
+                    </a:solidFill>
+                  </a:tcPr>
+                </a:tc>
+                <a:tc>
+                  <a:txBody>
+                    <a:bodyPr/>
+                    <a:lstStyle/>
+                    <a:p>
+                      <a:pPr marL="0" marR="0" lvl="0" indent="0" algn="ctr" defTabSz="914400" rtl="0" eaLnBrk="1" fontAlgn="auto" latinLnBrk="0" hangingPunct="1">
+                        <a:lnSpc>
+                          <a:spcPct val="100000"/>
+                        </a:lnSpc>
+                        <a:spcBef>
+                          <a:spcPts val="0"/>
+                        </a:spcBef>
+                        <a:spcAft>
+                          <a:spcPts val="0"/>
+                        </a:spcAft>
+                        <a:buClrTx/>
+                        <a:buSzTx/>
+                        <a:buFontTx/>
+                        <a:buNone/>
+                        <a:tabLst/>
+                        <a:defRPr/>
+                      </a:pPr>
+                      <a:r>
+                        <a:rPr lang="en-US" dirty="0"/>
+                        <a:t>❌</a:t>
+                      </a:r>
+                    </a:p>
+                  </a:txBody>
+                  <a:tcPr anchor="ctr"/>
+                </a:tc>
+                <a:tc>
+                  <a:txBody>
+                    <a:bodyPr/>
+                    <a:lstStyle/>
+                    <a:p>
+                      <a:pPr algn="ctr"/>
+                      <a:r>
+                        <a:rPr lang="en-US" dirty="0"/>
+                        <a:t>❌</a:t>
+                      </a:r>
+                    </a:p>
+                  </a:txBody>
+                  <a:tcPr anchor="ctr"/>
+                </a:tc>
+                <a:tc>
+                  <a:txBody>
+                    <a:bodyPr/>
+                    <a:lstStyle/>
+                    <a:p>
+                      <a:pPr marL="0" marR="0" lvl="0" indent="0" algn="ctr" defTabSz="914400" rtl="0" eaLnBrk="1" fontAlgn="auto" latinLnBrk="0" hangingPunct="1">
+                        <a:lnSpc>
+                          <a:spcPct val="100000"/>
+                        </a:lnSpc>
+                        <a:spcBef>
+                          <a:spcPts val="0"/>
+                        </a:spcBef>
+                        <a:spcAft>
+                          <a:spcPts val="0"/>
+                        </a:spcAft>
+                        <a:buClrTx/>
+                        <a:buSzTx/>
+                        <a:buFontTx/>
+                        <a:buNone/>
+                        <a:tabLst/>
+                        <a:defRPr/>
+                      </a:pPr>
+                      <a:r>
+                        <a:rPr lang="en-US" dirty="0"/>
+                        <a:t>✔️</a:t>
+                      </a:r>
+                    </a:p>
+                  </a:txBody>
+                  <a:tcPr anchor="ctr">
+                    <a:solidFill>
+                      <a:schemeClr val="accent6">
+                        <a:lumMod val="40000"/>
+                        <a:lumOff val="60000"/>
+                      </a:schemeClr>
+                    </a:solidFill>
+                  </a:tcPr>
+                </a:tc>
+                <a:extLst>
+                  <a:ext uri="{0D108BD9-81ED-4DB2-BD59-A6C34878D82A}">
+                    <a16:rowId xmlns:a16="http://schemas.microsoft.com/office/drawing/2014/main" val="1598743013"/>
+                  </a:ext>
+                </a:extLst>
+              </a:tr>
+              <a:tr h="707825">
+                <a:tc>
+                  <a:txBody>
+                    <a:bodyPr/>
+                    <a:lstStyle/>
+                    <a:p>
+                      <a:pPr algn="ctr"/>
+                      <a:r>
+                        <a:rPr lang="en-US" sz="1800" b="0" i="0" kern="1200" dirty="0">
+                          <a:solidFill>
+                            <a:schemeClr val="tx1"/>
+                          </a:solidFill>
+                          <a:effectLst/>
+                          <a:latin typeface="+mn-lt"/>
+                          <a:ea typeface="+mn-ea"/>
+                          <a:cs typeface="+mn-cs"/>
+                        </a:rPr>
+                        <a:t>Describes features contribution to total variance (PCA)</a:t>
+                      </a:r>
+                    </a:p>
+                  </a:txBody>
+                  <a:tcPr anchor="ctr"/>
+                </a:tc>
+                <a:tc>
+                  <a:txBody>
+                    <a:bodyPr/>
+                    <a:lstStyle/>
+                    <a:p>
+                      <a:pPr marL="0" marR="0" lvl="0" indent="0" algn="ctr" defTabSz="914400" rtl="0" eaLnBrk="1" fontAlgn="auto" latinLnBrk="0" hangingPunct="1">
+                        <a:lnSpc>
+                          <a:spcPct val="100000"/>
+                        </a:lnSpc>
+                        <a:spcBef>
+                          <a:spcPts val="0"/>
+                        </a:spcBef>
+                        <a:spcAft>
+                          <a:spcPts val="0"/>
+                        </a:spcAft>
+                        <a:buClrTx/>
+                        <a:buSzTx/>
+                        <a:buFontTx/>
+                        <a:buNone/>
+                        <a:tabLst/>
+                        <a:defRPr/>
+                      </a:pPr>
+                      <a:r>
+                        <a:rPr lang="en-US" dirty="0"/>
+                        <a:t>❌</a:t>
+                      </a:r>
+                    </a:p>
+                  </a:txBody>
+                  <a:tcPr anchor="ctr"/>
+                </a:tc>
+                <a:tc>
+                  <a:txBody>
+                    <a:bodyPr/>
+                    <a:lstStyle/>
+                    <a:p>
+                      <a:pPr algn="ctr"/>
+                      <a:r>
+                        <a:rPr lang="en-US" dirty="0"/>
+                        <a:t>❌</a:t>
+                      </a:r>
+                    </a:p>
+                  </a:txBody>
+                  <a:tcPr anchor="ctr"/>
+                </a:tc>
+                <a:tc>
+                  <a:txBody>
+                    <a:bodyPr/>
+                    <a:lstStyle/>
+                    <a:p>
+                      <a:pPr marL="0" marR="0" lvl="0" indent="0" algn="ctr" defTabSz="914400" rtl="0" eaLnBrk="1" fontAlgn="auto" latinLnBrk="0" hangingPunct="1">
+                        <a:lnSpc>
+                          <a:spcPct val="100000"/>
+                        </a:lnSpc>
+                        <a:spcBef>
+                          <a:spcPts val="0"/>
+                        </a:spcBef>
+                        <a:spcAft>
+                          <a:spcPts val="0"/>
+                        </a:spcAft>
+                        <a:buClrTx/>
+                        <a:buSzTx/>
+                        <a:buFontTx/>
+                        <a:buNone/>
+                        <a:tabLst/>
+                        <a:defRPr/>
+                      </a:pPr>
+                      <a:r>
+                        <a:rPr lang="en-US" dirty="0"/>
+                        <a:t>✔️</a:t>
+                      </a:r>
+                    </a:p>
+                  </a:txBody>
+                  <a:tcPr anchor="ctr">
+                    <a:solidFill>
+                      <a:schemeClr val="accent6">
+                        <a:lumMod val="40000"/>
+                        <a:lumOff val="60000"/>
+                      </a:schemeClr>
+                    </a:solidFill>
+                  </a:tcPr>
+                </a:tc>
+                <a:tc>
+                  <a:txBody>
+                    <a:bodyPr/>
+                    <a:lstStyle/>
+                    <a:p>
+                      <a:pPr algn="ctr"/>
+                      <a:r>
+                        <a:rPr lang="en-US" dirty="0"/>
+                        <a:t>❌</a:t>
+                      </a:r>
+                    </a:p>
+                  </a:txBody>
+                  <a:tcPr anchor="ctr"/>
+                </a:tc>
+                <a:tc>
+                  <a:txBody>
+                    <a:bodyPr/>
+                    <a:lstStyle/>
+                    <a:p>
+                      <a:pPr algn="ctr"/>
+                      <a:r>
+                        <a:rPr lang="en-US" dirty="0"/>
+                        <a:t>❌</a:t>
+                      </a:r>
+                    </a:p>
+                  </a:txBody>
+                  <a:tcPr anchor="ctr"/>
+                </a:tc>
+                <a:extLst>
+                  <a:ext uri="{0D108BD9-81ED-4DB2-BD59-A6C34878D82A}">
+                    <a16:rowId xmlns:a16="http://schemas.microsoft.com/office/drawing/2014/main" val="2802569120"/>
+                  </a:ext>
+                </a:extLst>
+              </a:tr>
+              <a:tr h="707825">
+                <a:tc>
+                  <a:txBody>
+                    <a:bodyPr/>
+                    <a:lstStyle/>
+                    <a:p>
+                      <a:pPr algn="ctr"/>
+                      <a:r>
+                        <a:rPr lang="en-US" sz="1800" b="0" i="0" kern="1200" dirty="0">
+                          <a:solidFill>
+                            <a:schemeClr val="tx1"/>
+                          </a:solidFill>
+                          <a:effectLst/>
+                          <a:latin typeface="+mn-lt"/>
+                          <a:ea typeface="+mn-ea"/>
+                          <a:cs typeface="+mn-cs"/>
+                        </a:rPr>
+                        <a:t>Generates Publication Quality Figures</a:t>
+                      </a:r>
+                    </a:p>
+                  </a:txBody>
+                  <a:tcPr anchor="ctr"/>
+                </a:tc>
+                <a:tc>
+                  <a:txBody>
+                    <a:bodyPr/>
+                    <a:lstStyle/>
+                    <a:p>
+                      <a:pPr marL="0" marR="0" lvl="0" indent="0" algn="ctr" defTabSz="914400" rtl="0" eaLnBrk="1" fontAlgn="auto" latinLnBrk="0" hangingPunct="1">
+                        <a:lnSpc>
+                          <a:spcPct val="100000"/>
+                        </a:lnSpc>
+                        <a:spcBef>
+                          <a:spcPts val="0"/>
+                        </a:spcBef>
+                        <a:spcAft>
+                          <a:spcPts val="0"/>
+                        </a:spcAft>
+                        <a:buClrTx/>
+                        <a:buSzTx/>
+                        <a:buFontTx/>
+                        <a:buNone/>
+                        <a:tabLst/>
+                        <a:defRPr/>
+                      </a:pPr>
+                      <a:r>
+                        <a:rPr lang="en-US" dirty="0"/>
+                        <a:t>✔️</a:t>
+                      </a:r>
+                    </a:p>
+                  </a:txBody>
+                  <a:tcPr anchor="ctr">
+                    <a:solidFill>
+                      <a:schemeClr val="accent6">
+                        <a:lumMod val="40000"/>
+                        <a:lumOff val="60000"/>
+                      </a:schemeClr>
+                    </a:solidFill>
+                  </a:tcPr>
+                </a:tc>
+                <a:tc>
+                  <a:txBody>
+                    <a:bodyPr/>
+                    <a:lstStyle/>
+                    <a:p>
+                      <a:pPr marL="0" marR="0" lvl="0" indent="0" algn="ctr" defTabSz="914400" rtl="0" eaLnBrk="1" fontAlgn="auto" latinLnBrk="0" hangingPunct="1">
+                        <a:lnSpc>
+                          <a:spcPct val="100000"/>
+                        </a:lnSpc>
+                        <a:spcBef>
+                          <a:spcPts val="0"/>
+                        </a:spcBef>
+                        <a:spcAft>
+                          <a:spcPts val="0"/>
+                        </a:spcAft>
+                        <a:buClrTx/>
+                        <a:buSzTx/>
+                        <a:buFontTx/>
+                        <a:buNone/>
+                        <a:tabLst/>
+                        <a:defRPr/>
+                      </a:pPr>
+                      <a:r>
+                        <a:rPr lang="en-US" dirty="0"/>
+                        <a:t>✔️</a:t>
+                      </a:r>
+                    </a:p>
+                  </a:txBody>
+                  <a:tcPr anchor="ctr">
+                    <a:solidFill>
+                      <a:schemeClr val="accent6">
+                        <a:lumMod val="40000"/>
+                        <a:lumOff val="60000"/>
+                      </a:schemeClr>
+                    </a:solidFill>
+                  </a:tcPr>
+                </a:tc>
+                <a:tc>
+                  <a:txBody>
+                    <a:bodyPr/>
+                    <a:lstStyle/>
+                    <a:p>
+                      <a:pPr marL="0" marR="0" lvl="0" indent="0" algn="ctr" defTabSz="914400" rtl="0" eaLnBrk="1" fontAlgn="auto" latinLnBrk="0" hangingPunct="1">
+                        <a:lnSpc>
+                          <a:spcPct val="100000"/>
+                        </a:lnSpc>
+                        <a:spcBef>
+                          <a:spcPts val="0"/>
+                        </a:spcBef>
+                        <a:spcAft>
+                          <a:spcPts val="0"/>
+                        </a:spcAft>
+                        <a:buClrTx/>
+                        <a:buSzTx/>
+                        <a:buFontTx/>
+                        <a:buNone/>
+                        <a:tabLst/>
+                        <a:defRPr/>
+                      </a:pPr>
+                      <a:r>
+                        <a:rPr lang="en-US" dirty="0"/>
+                        <a:t>❌</a:t>
+                      </a:r>
+                    </a:p>
+                  </a:txBody>
+                  <a:tcPr anchor="ctr">
+                    <a:noFill/>
+                  </a:tcPr>
+                </a:tc>
+                <a:tc>
+                  <a:txBody>
+                    <a:bodyPr/>
+                    <a:lstStyle/>
+                    <a:p>
+                      <a:pPr marL="0" marR="0" lvl="0" indent="0" algn="ctr" defTabSz="914400" rtl="0" eaLnBrk="1" fontAlgn="auto" latinLnBrk="0" hangingPunct="1">
+                        <a:lnSpc>
+                          <a:spcPct val="100000"/>
+                        </a:lnSpc>
+                        <a:spcBef>
+                          <a:spcPts val="0"/>
+                        </a:spcBef>
+                        <a:spcAft>
+                          <a:spcPts val="0"/>
+                        </a:spcAft>
+                        <a:buClrTx/>
+                        <a:buSzTx/>
+                        <a:buFontTx/>
+                        <a:buNone/>
+                        <a:tabLst/>
+                        <a:defRPr/>
+                      </a:pPr>
+                      <a:r>
+                        <a:rPr lang="en-US" dirty="0"/>
+                        <a:t>❌</a:t>
+                      </a:r>
+                    </a:p>
+                  </a:txBody>
+                  <a:tcPr anchor="ctr"/>
+                </a:tc>
+                <a:tc>
+                  <a:txBody>
+                    <a:bodyPr/>
+                    <a:lstStyle/>
+                    <a:p>
+                      <a:pPr marL="0" marR="0" lvl="0" indent="0" algn="ctr" defTabSz="914400" rtl="0" eaLnBrk="1" fontAlgn="auto" latinLnBrk="0" hangingPunct="1">
+                        <a:lnSpc>
+                          <a:spcPct val="100000"/>
+                        </a:lnSpc>
+                        <a:spcBef>
+                          <a:spcPts val="0"/>
+                        </a:spcBef>
+                        <a:spcAft>
+                          <a:spcPts val="0"/>
+                        </a:spcAft>
+                        <a:buClrTx/>
+                        <a:buSzTx/>
+                        <a:buFontTx/>
+                        <a:buNone/>
+                        <a:tabLst/>
+                        <a:defRPr/>
+                      </a:pPr>
+                      <a:r>
+                        <a:rPr lang="en-US" dirty="0"/>
+                        <a:t>✔️</a:t>
+                      </a:r>
+                    </a:p>
+                  </a:txBody>
+                  <a:tcPr anchor="ctr">
+                    <a:solidFill>
+                      <a:schemeClr val="accent6">
+                        <a:lumMod val="40000"/>
+                        <a:lumOff val="60000"/>
+                      </a:schemeClr>
+                    </a:solidFill>
+                  </a:tcPr>
+                </a:tc>
+                <a:extLst>
+                  <a:ext uri="{0D108BD9-81ED-4DB2-BD59-A6C34878D82A}">
+                    <a16:rowId xmlns:a16="http://schemas.microsoft.com/office/drawing/2014/main" val="2806526375"/>
+                  </a:ext>
+                </a:extLst>
+              </a:tr>
+              <a:tr h="707825">
+                <a:tc>
+                  <a:txBody>
+                    <a:bodyPr/>
+                    <a:lstStyle/>
+                    <a:p>
+                      <a:pPr algn="ctr"/>
+                      <a:r>
+                        <a:rPr lang="en-US" dirty="0"/>
+                        <a:t>Reveals missingness dependent on multiple features</a:t>
+                      </a:r>
+                    </a:p>
+                  </a:txBody>
+                  <a:tcPr anchor="ctr"/>
+                </a:tc>
+                <a:tc>
+                  <a:txBody>
+                    <a:bodyPr/>
+                    <a:lstStyle/>
+                    <a:p>
+                      <a:pPr marL="0" marR="0" lvl="0" indent="0" algn="ctr" defTabSz="914400" rtl="0" eaLnBrk="1" fontAlgn="auto" latinLnBrk="0" hangingPunct="1">
+                        <a:lnSpc>
+                          <a:spcPct val="100000"/>
+                        </a:lnSpc>
+                        <a:spcBef>
+                          <a:spcPts val="0"/>
+                        </a:spcBef>
+                        <a:spcAft>
+                          <a:spcPts val="0"/>
+                        </a:spcAft>
+                        <a:buClrTx/>
+                        <a:buSzTx/>
+                        <a:buFontTx/>
+                        <a:buNone/>
+                        <a:tabLst/>
+                        <a:defRPr/>
+                      </a:pPr>
+                      <a:r>
+                        <a:rPr lang="en-US" dirty="0"/>
+                        <a:t>✔️</a:t>
+                      </a:r>
+                    </a:p>
+                  </a:txBody>
+                  <a:tcPr anchor="ctr">
+                    <a:solidFill>
+                      <a:schemeClr val="accent6">
+                        <a:lumMod val="40000"/>
+                        <a:lumOff val="60000"/>
+                      </a:schemeClr>
+                    </a:solidFill>
+                  </a:tcPr>
+                </a:tc>
+                <a:tc>
+                  <a:txBody>
+                    <a:bodyPr/>
+                    <a:lstStyle/>
+                    <a:p>
+                      <a:pPr marL="0" marR="0" lvl="0" indent="0" algn="ctr" defTabSz="914400" rtl="0" eaLnBrk="1" fontAlgn="auto" latinLnBrk="0" hangingPunct="1">
+                        <a:lnSpc>
+                          <a:spcPct val="100000"/>
+                        </a:lnSpc>
+                        <a:spcBef>
+                          <a:spcPts val="0"/>
+                        </a:spcBef>
+                        <a:spcAft>
+                          <a:spcPts val="0"/>
+                        </a:spcAft>
+                        <a:buClrTx/>
+                        <a:buSzTx/>
+                        <a:buFontTx/>
+                        <a:buNone/>
+                        <a:tabLst/>
+                        <a:defRPr/>
+                      </a:pPr>
+                      <a:r>
+                        <a:rPr lang="en-US" dirty="0"/>
+                        <a:t>❌</a:t>
+                      </a:r>
+                    </a:p>
+                  </a:txBody>
+                  <a:tcPr anchor="ctr"/>
+                </a:tc>
+                <a:tc>
+                  <a:txBody>
+                    <a:bodyPr/>
+                    <a:lstStyle/>
+                    <a:p>
+                      <a:pPr marL="0" marR="0" lvl="0" indent="0" algn="ctr" defTabSz="914400" rtl="0" eaLnBrk="1" fontAlgn="auto" latinLnBrk="0" hangingPunct="1">
+                        <a:lnSpc>
+                          <a:spcPct val="100000"/>
+                        </a:lnSpc>
+                        <a:spcBef>
+                          <a:spcPts val="0"/>
+                        </a:spcBef>
+                        <a:spcAft>
+                          <a:spcPts val="0"/>
+                        </a:spcAft>
+                        <a:buClrTx/>
+                        <a:buSzTx/>
+                        <a:buFontTx/>
+                        <a:buNone/>
+                        <a:tabLst/>
+                        <a:defRPr/>
+                      </a:pPr>
+                      <a:r>
+                        <a:rPr lang="en-US" dirty="0"/>
+                        <a:t>❌</a:t>
+                      </a:r>
+                    </a:p>
+                  </a:txBody>
+                  <a:tcPr anchor="ctr"/>
+                </a:tc>
+                <a:tc>
+                  <a:txBody>
+                    <a:bodyPr/>
+                    <a:lstStyle/>
+                    <a:p>
+                      <a:pPr marL="0" marR="0" lvl="0" indent="0" algn="ctr" defTabSz="914400" rtl="0" eaLnBrk="1" fontAlgn="auto" latinLnBrk="0" hangingPunct="1">
+                        <a:lnSpc>
+                          <a:spcPct val="100000"/>
+                        </a:lnSpc>
+                        <a:spcBef>
+                          <a:spcPts val="0"/>
+                        </a:spcBef>
+                        <a:spcAft>
+                          <a:spcPts val="0"/>
+                        </a:spcAft>
+                        <a:buClrTx/>
+                        <a:buSzTx/>
+                        <a:buFontTx/>
+                        <a:buNone/>
+                        <a:tabLst/>
+                        <a:defRPr/>
+                      </a:pPr>
+                      <a:r>
+                        <a:rPr lang="en-US" dirty="0"/>
+                        <a:t>❌</a:t>
+                      </a:r>
+                    </a:p>
+                  </a:txBody>
+                  <a:tcPr anchor="ctr"/>
+                </a:tc>
+                <a:tc>
+                  <a:txBody>
+                    <a:bodyPr/>
+                    <a:lstStyle/>
+                    <a:p>
+                      <a:pPr marL="0" marR="0" lvl="0" indent="0" algn="ctr" defTabSz="914400" rtl="0" eaLnBrk="1" fontAlgn="auto" latinLnBrk="0" hangingPunct="1">
+                        <a:lnSpc>
+                          <a:spcPct val="100000"/>
+                        </a:lnSpc>
+                        <a:spcBef>
+                          <a:spcPts val="0"/>
+                        </a:spcBef>
+                        <a:spcAft>
+                          <a:spcPts val="0"/>
+                        </a:spcAft>
+                        <a:buClrTx/>
+                        <a:buSzTx/>
+                        <a:buFontTx/>
+                        <a:buNone/>
+                        <a:tabLst/>
+                        <a:defRPr/>
+                      </a:pPr>
+                      <a:r>
+                        <a:rPr lang="en-US" dirty="0"/>
+                        <a:t>❌</a:t>
+                      </a:r>
+                    </a:p>
+                  </a:txBody>
+                  <a:tcPr anchor="ctr"/>
+                </a:tc>
+                <a:extLst>
+                  <a:ext uri="{0D108BD9-81ED-4DB2-BD59-A6C34878D82A}">
+                    <a16:rowId xmlns:a16="http://schemas.microsoft.com/office/drawing/2014/main" val="3649322498"/>
+                  </a:ext>
+                </a:extLst>
+              </a:tr>
+            </a:tbl>
+          </a:graphicData>
+        </a:graphic>
+      </p:graphicFrame>
+    </p:spTree>
+    <p:extLst>
+      <p:ext uri="{BB962C8B-B14F-4D97-AF65-F5344CB8AC3E}">
+        <p14:creationId xmlns:p14="http://schemas.microsoft.com/office/powerpoint/2010/main" val="2586013285"/>
+      </p:ext>
+    </p:extLst>
+  </p:cSld>
+  <p:clrMapOvr>
+    <a:masterClrMapping/>
+  </p:clrMapOvr>
+</p:sld>
+</file>
+
+<file path=ppt/slides/slide9.xml><?xml version="1.0" encoding="utf-8"?>
+<p:sld xmlns:a="http://schemas.openxmlformats.org/drawingml/2006/main" xmlns:r="http://schemas.openxmlformats.org/officeDocument/2006/relationships" xmlns:p="http://schemas.openxmlformats.org/presentationml/2006/main">
+  <p:cSld>
+    <p:spTree>
+      <p:nvGrpSpPr>
+        <p:cNvPr id="1" name="">
+          <a:extLst>
+            <a:ext uri="{FF2B5EF4-FFF2-40B4-BE49-F238E27FC236}">
+              <a16:creationId xmlns:a16="http://schemas.microsoft.com/office/drawing/2014/main" id="{6DF9EC51-BF8A-0B49-A0BE-8E09EF5FAC9F}"/>
+            </a:ext>
+          </a:extLst>
+        </p:cNvPr>
+        <p:cNvGrpSpPr/>
+        <p:nvPr/>
+      </p:nvGrpSpPr>
+      <p:grpSpPr>
+        <a:xfrm>
+          <a:off x="0" y="0"/>
+          <a:ext cx="0" cy="0"/>
+          <a:chOff x="0" y="0"/>
+          <a:chExt cx="0" cy="0"/>
+        </a:xfrm>
+      </p:grpSpPr>
+      <p:pic>
+        <p:nvPicPr>
+          <p:cNvPr id="21" name="Picture 20">
+            <a:extLst>
+              <a:ext uri="{FF2B5EF4-FFF2-40B4-BE49-F238E27FC236}">
+                <a16:creationId xmlns:a16="http://schemas.microsoft.com/office/drawing/2014/main" id="{CA079A26-72E3-151F-646D-4A07278955AD}"/>
+              </a:ext>
+            </a:extLst>
+          </p:cNvPr>
+          <p:cNvPicPr>
+            <a:picLocks noChangeAspect="1"/>
+          </p:cNvPicPr>
+          <p:nvPr/>
+        </p:nvPicPr>
+        <p:blipFill>
+          <a:blip r:embed="rId2"/>
+          <a:stretch>
+            <a:fillRect/>
+          </a:stretch>
+        </p:blipFill>
+        <p:spPr>
+          <a:xfrm>
+            <a:off x="672317" y="892937"/>
+            <a:ext cx="8561366" cy="2140342"/>
+          </a:xfrm>
+          <a:prstGeom prst="rect">
+            <a:avLst/>
+          </a:prstGeom>
+        </p:spPr>
+      </p:pic>
+      <p:sp>
+        <p:nvSpPr>
+          <p:cNvPr id="28" name="TextBox 27">
+            <a:extLst>
+              <a:ext uri="{FF2B5EF4-FFF2-40B4-BE49-F238E27FC236}">
+                <a16:creationId xmlns:a16="http://schemas.microsoft.com/office/drawing/2014/main" id="{8FB1F19C-380A-DA19-9AE1-7FBE9D98A27A}"/>
+              </a:ext>
+            </a:extLst>
+          </p:cNvPr>
+          <p:cNvSpPr txBox="1"/>
+          <p:nvPr/>
+        </p:nvSpPr>
+        <p:spPr>
+          <a:xfrm>
+            <a:off x="562233" y="3358425"/>
+            <a:ext cx="340158" cy="369332"/>
+          </a:xfrm>
+          <a:prstGeom prst="rect">
+            <a:avLst/>
+          </a:prstGeom>
+          <a:noFill/>
+        </p:spPr>
+        <p:txBody>
+          <a:bodyPr wrap="square" rtlCol="0">
+            <a:spAutoFit/>
+          </a:bodyPr>
+          <a:lstStyle/>
+          <a:p>
+            <a:r>
+              <a:rPr lang="en-US" b="1" dirty="0">
+                <a:latin typeface="Roboto" panose="02000000000000000000" pitchFamily="2" charset="0"/>
+                <a:ea typeface="Roboto" panose="02000000000000000000" pitchFamily="2" charset="0"/>
+              </a:rPr>
+              <a:t>B</a:t>
+            </a:r>
+          </a:p>
+        </p:txBody>
+      </p:sp>
+      <p:sp>
+        <p:nvSpPr>
+          <p:cNvPr id="7" name="TextBox 6">
+            <a:extLst>
+              <a:ext uri="{FF2B5EF4-FFF2-40B4-BE49-F238E27FC236}">
+                <a16:creationId xmlns:a16="http://schemas.microsoft.com/office/drawing/2014/main" id="{AF8B696B-E9DF-5B66-570A-FA3BA2244384}"/>
+              </a:ext>
+            </a:extLst>
+          </p:cNvPr>
+          <p:cNvSpPr txBox="1"/>
+          <p:nvPr/>
+        </p:nvSpPr>
+        <p:spPr>
+          <a:xfrm>
+            <a:off x="513566" y="401691"/>
+            <a:ext cx="340158" cy="369332"/>
+          </a:xfrm>
+          <a:prstGeom prst="rect">
+            <a:avLst/>
+          </a:prstGeom>
+          <a:noFill/>
+        </p:spPr>
+        <p:txBody>
+          <a:bodyPr wrap="none" rtlCol="0">
+            <a:spAutoFit/>
+          </a:bodyPr>
+          <a:lstStyle/>
+          <a:p>
+            <a:r>
+              <a:rPr lang="en-US" b="1" dirty="0">
+                <a:latin typeface="Roboto" panose="02000000000000000000" pitchFamily="2" charset="0"/>
+                <a:ea typeface="Roboto" panose="02000000000000000000" pitchFamily="2" charset="0"/>
+              </a:rPr>
+              <a:t>A</a:t>
+            </a:r>
+          </a:p>
+        </p:txBody>
+      </p:sp>
+      <p:pic>
+        <p:nvPicPr>
+          <p:cNvPr id="10" name="Picture 9">
+            <a:extLst>
+              <a:ext uri="{FF2B5EF4-FFF2-40B4-BE49-F238E27FC236}">
+                <a16:creationId xmlns:a16="http://schemas.microsoft.com/office/drawing/2014/main" id="{90195C94-F174-3562-63B1-5ADF971FF2F7}"/>
+              </a:ext>
+            </a:extLst>
+          </p:cNvPr>
+          <p:cNvPicPr>
+            <a:picLocks noChangeAspect="1"/>
+          </p:cNvPicPr>
+          <p:nvPr/>
+        </p:nvPicPr>
+        <p:blipFill>
+          <a:blip r:embed="rId3"/>
+          <a:stretch>
+            <a:fillRect/>
+          </a:stretch>
+        </p:blipFill>
+        <p:spPr>
+          <a:xfrm>
+            <a:off x="5657777" y="3866456"/>
+            <a:ext cx="3921325" cy="3137060"/>
+          </a:xfrm>
+          <a:prstGeom prst="rect">
+            <a:avLst/>
+          </a:prstGeom>
+        </p:spPr>
+      </p:pic>
+      <p:pic>
+        <p:nvPicPr>
+          <p:cNvPr id="11" name="Picture 10">
+            <a:extLst>
+              <a:ext uri="{FF2B5EF4-FFF2-40B4-BE49-F238E27FC236}">
+                <a16:creationId xmlns:a16="http://schemas.microsoft.com/office/drawing/2014/main" id="{E440C87F-048B-1237-970B-74FC4DEEB252}"/>
+              </a:ext>
+            </a:extLst>
+          </p:cNvPr>
+          <p:cNvPicPr>
+            <a:picLocks noChangeAspect="1"/>
+          </p:cNvPicPr>
+          <p:nvPr/>
+        </p:nvPicPr>
+        <p:blipFill>
+          <a:blip r:embed="rId4"/>
+          <a:srcRect t="1794" r="5127" b="1"/>
+          <a:stretch/>
+        </p:blipFill>
+        <p:spPr>
+          <a:xfrm>
+            <a:off x="752844" y="3979364"/>
+            <a:ext cx="4632966" cy="2898324"/>
+          </a:xfrm>
+          <a:prstGeom prst="rect">
+            <a:avLst/>
+          </a:prstGeom>
+        </p:spPr>
+      </p:pic>
+      <p:sp>
+        <p:nvSpPr>
+          <p:cNvPr id="12" name="TextBox 11">
+            <a:extLst>
+              <a:ext uri="{FF2B5EF4-FFF2-40B4-BE49-F238E27FC236}">
+                <a16:creationId xmlns:a16="http://schemas.microsoft.com/office/drawing/2014/main" id="{6B386E7B-EBBE-CB35-46D6-F6BE901EC05A}"/>
+              </a:ext>
+            </a:extLst>
+          </p:cNvPr>
+          <p:cNvSpPr txBox="1"/>
+          <p:nvPr/>
+        </p:nvSpPr>
+        <p:spPr>
+          <a:xfrm>
+            <a:off x="5304367" y="3358425"/>
+            <a:ext cx="340158" cy="369332"/>
+          </a:xfrm>
+          <a:prstGeom prst="rect">
+            <a:avLst/>
+          </a:prstGeom>
+          <a:noFill/>
+        </p:spPr>
+        <p:txBody>
+          <a:bodyPr wrap="square" rtlCol="0">
+            <a:spAutoFit/>
+          </a:bodyPr>
+          <a:lstStyle/>
+          <a:p>
+            <a:r>
+              <a:rPr lang="en-US" b="1" dirty="0">
+                <a:latin typeface="Roboto" panose="02000000000000000000" pitchFamily="2" charset="0"/>
+                <a:ea typeface="Roboto" panose="02000000000000000000" pitchFamily="2" charset="0"/>
+              </a:rPr>
+              <a:t>C</a:t>
+            </a:r>
+          </a:p>
+        </p:txBody>
+      </p:sp>
+      <p:sp>
+        <p:nvSpPr>
+          <p:cNvPr id="13" name="Rectangle 12">
+            <a:extLst>
+              <a:ext uri="{FF2B5EF4-FFF2-40B4-BE49-F238E27FC236}">
+                <a16:creationId xmlns:a16="http://schemas.microsoft.com/office/drawing/2014/main" id="{3706FF81-789A-EA68-87CE-0C8B9AA0AE36}"/>
+              </a:ext>
+            </a:extLst>
+          </p:cNvPr>
+          <p:cNvSpPr/>
+          <p:nvPr/>
+        </p:nvSpPr>
+        <p:spPr>
+          <a:xfrm>
+            <a:off x="2343807" y="6537355"/>
+            <a:ext cx="830317" cy="369331"/>
+          </a:xfrm>
+          <a:prstGeom prst="rect">
+            <a:avLst/>
+          </a:prstGeom>
+          <a:noFill/>
+          <a:ln w="38100">
+            <a:solidFill>
+              <a:schemeClr val="accent5"/>
+            </a:solidFill>
+          </a:ln>
+        </p:spPr>
+        <p:style>
+          <a:lnRef idx="2">
+            <a:schemeClr val="accent1">
+              <a:shade val="15000"/>
+            </a:schemeClr>
+          </a:lnRef>
+          <a:fillRef idx="1">
+            <a:schemeClr val="accent1"/>
+          </a:fillRef>
+          <a:effectRef idx="0">
+            <a:schemeClr val="accent1"/>
+          </a:effectRef>
+          <a:fontRef idx="minor">
+            <a:schemeClr val="lt1"/>
+          </a:fontRef>
+        </p:style>
+        <p:txBody>
+          <a:bodyPr rtlCol="0" anchor="ctr"/>
+          <a:lstStyle/>
+          <a:p>
+            <a:pPr algn="ctr"/>
+            <a:endParaRPr lang="en-US"/>
+          </a:p>
+        </p:txBody>
+      </p:sp>
+      <p:sp>
+        <p:nvSpPr>
+          <p:cNvPr id="14" name="TextBox 13">
+            <a:extLst>
+              <a:ext uri="{FF2B5EF4-FFF2-40B4-BE49-F238E27FC236}">
+                <a16:creationId xmlns:a16="http://schemas.microsoft.com/office/drawing/2014/main" id="{6BB879E8-1172-AC40-2C81-16DFA12B8817}"/>
+              </a:ext>
+            </a:extLst>
+          </p:cNvPr>
+          <p:cNvSpPr txBox="1"/>
+          <p:nvPr/>
+        </p:nvSpPr>
+        <p:spPr>
+          <a:xfrm>
+            <a:off x="2090084" y="3442435"/>
+            <a:ext cx="772969" cy="369332"/>
+          </a:xfrm>
+          <a:prstGeom prst="rect">
+            <a:avLst/>
+          </a:prstGeom>
+          <a:noFill/>
+        </p:spPr>
+        <p:txBody>
+          <a:bodyPr wrap="none" rtlCol="0">
+            <a:spAutoFit/>
+          </a:bodyPr>
+          <a:lstStyle/>
+          <a:p>
+            <a:r>
+              <a:rPr lang="en-US" b="1" dirty="0" err="1">
+                <a:latin typeface="Roboto" panose="02000000000000000000" pitchFamily="2" charset="0"/>
+                <a:ea typeface="Roboto" panose="02000000000000000000" pitchFamily="2" charset="0"/>
+              </a:rPr>
+              <a:t>skimr</a:t>
+            </a:r>
+            <a:endParaRPr lang="en-US" b="1" dirty="0">
+              <a:latin typeface="Roboto" panose="02000000000000000000" pitchFamily="2" charset="0"/>
+              <a:ea typeface="Roboto" panose="02000000000000000000" pitchFamily="2" charset="0"/>
+            </a:endParaRPr>
+          </a:p>
+        </p:txBody>
+      </p:sp>
+      <p:sp>
+        <p:nvSpPr>
+          <p:cNvPr id="15" name="TextBox 14">
+            <a:extLst>
+              <a:ext uri="{FF2B5EF4-FFF2-40B4-BE49-F238E27FC236}">
+                <a16:creationId xmlns:a16="http://schemas.microsoft.com/office/drawing/2014/main" id="{7686AF9F-4E79-603A-7E2C-33289B5178AB}"/>
+              </a:ext>
+            </a:extLst>
+          </p:cNvPr>
+          <p:cNvSpPr txBox="1"/>
+          <p:nvPr/>
+        </p:nvSpPr>
+        <p:spPr>
+          <a:xfrm>
+            <a:off x="7200175" y="3442435"/>
+            <a:ext cx="859531" cy="369332"/>
+          </a:xfrm>
+          <a:prstGeom prst="rect">
+            <a:avLst/>
+          </a:prstGeom>
+          <a:noFill/>
+        </p:spPr>
+        <p:txBody>
+          <a:bodyPr wrap="none" rtlCol="0">
+            <a:spAutoFit/>
+          </a:bodyPr>
+          <a:lstStyle/>
+          <a:p>
+            <a:r>
+              <a:rPr lang="en-US" b="1" dirty="0" err="1">
+                <a:latin typeface="Roboto" panose="02000000000000000000" pitchFamily="2" charset="0"/>
+                <a:ea typeface="Roboto" panose="02000000000000000000" pitchFamily="2" charset="0"/>
+              </a:rPr>
+              <a:t>GGally</a:t>
+            </a:r>
+            <a:endParaRPr lang="en-US" b="1" dirty="0">
+              <a:latin typeface="Roboto" panose="02000000000000000000" pitchFamily="2" charset="0"/>
+              <a:ea typeface="Roboto" panose="02000000000000000000" pitchFamily="2" charset="0"/>
+            </a:endParaRPr>
+          </a:p>
+        </p:txBody>
+      </p:sp>
+      <p:sp>
+        <p:nvSpPr>
+          <p:cNvPr id="19" name="TextBox 18">
+            <a:extLst>
+              <a:ext uri="{FF2B5EF4-FFF2-40B4-BE49-F238E27FC236}">
+                <a16:creationId xmlns:a16="http://schemas.microsoft.com/office/drawing/2014/main" id="{8E965E81-87E2-CBCF-AD97-2215D10FAEA5}"/>
+              </a:ext>
+            </a:extLst>
+          </p:cNvPr>
+          <p:cNvSpPr txBox="1"/>
+          <p:nvPr/>
+        </p:nvSpPr>
+        <p:spPr>
+          <a:xfrm>
+            <a:off x="4331787" y="523605"/>
+            <a:ext cx="1312738" cy="369332"/>
+          </a:xfrm>
+          <a:prstGeom prst="rect">
+            <a:avLst/>
+          </a:prstGeom>
+          <a:noFill/>
+        </p:spPr>
+        <p:txBody>
+          <a:bodyPr wrap="square" rtlCol="0">
+            <a:spAutoFit/>
+          </a:bodyPr>
+          <a:lstStyle/>
+          <a:p>
+            <a:r>
+              <a:rPr lang="en-US" b="1" dirty="0">
+                <a:latin typeface="Roboto" panose="02000000000000000000" pitchFamily="2" charset="0"/>
+                <a:ea typeface="Roboto" panose="02000000000000000000" pitchFamily="2" charset="0"/>
+              </a:rPr>
+              <a:t>gg1d</a:t>
+            </a:r>
+          </a:p>
+        </p:txBody>
+      </p:sp>
+      <p:cxnSp>
+        <p:nvCxnSpPr>
+          <p:cNvPr id="23" name="Straight Connector 22">
+            <a:extLst>
+              <a:ext uri="{FF2B5EF4-FFF2-40B4-BE49-F238E27FC236}">
+                <a16:creationId xmlns:a16="http://schemas.microsoft.com/office/drawing/2014/main" id="{DD98A445-AE6A-5DF9-CCCA-6664B7204AE2}"/>
+              </a:ext>
+            </a:extLst>
+          </p:cNvPr>
+          <p:cNvCxnSpPr/>
+          <p:nvPr/>
+        </p:nvCxnSpPr>
+        <p:spPr>
+          <a:xfrm>
+            <a:off x="6550702" y="1915835"/>
+            <a:ext cx="539646" cy="0"/>
+          </a:xfrm>
+          <a:prstGeom prst="line">
+            <a:avLst/>
+          </a:prstGeom>
+          <a:ln w="57150">
+            <a:solidFill>
+              <a:schemeClr val="accent5"/>
+            </a:solidFill>
+          </a:ln>
+        </p:spPr>
+        <p:style>
+          <a:lnRef idx="2">
+            <a:schemeClr val="accent1"/>
+          </a:lnRef>
+          <a:fillRef idx="0">
+            <a:schemeClr val="accent1"/>
+          </a:fillRef>
+          <a:effectRef idx="1">
+            <a:schemeClr val="accent1"/>
+          </a:effectRef>
+          <a:fontRef idx="minor">
+            <a:schemeClr val="tx1"/>
+          </a:fontRef>
+        </p:style>
+      </p:cxnSp>
+      <p:sp>
+        <p:nvSpPr>
+          <p:cNvPr id="27" name="TextBox 26">
+            <a:extLst>
+              <a:ext uri="{FF2B5EF4-FFF2-40B4-BE49-F238E27FC236}">
+                <a16:creationId xmlns:a16="http://schemas.microsoft.com/office/drawing/2014/main" id="{8DDA53F3-3EC2-E91B-0502-EF70C65297CB}"/>
+              </a:ext>
+            </a:extLst>
+          </p:cNvPr>
+          <p:cNvSpPr txBox="1"/>
+          <p:nvPr/>
+        </p:nvSpPr>
+        <p:spPr>
+          <a:xfrm>
+            <a:off x="5434482" y="1307209"/>
+            <a:ext cx="3044167" cy="338554"/>
+          </a:xfrm>
+          <a:prstGeom prst="rect">
+            <a:avLst/>
+          </a:prstGeom>
+          <a:noFill/>
+        </p:spPr>
+        <p:txBody>
+          <a:bodyPr wrap="none" rtlCol="0">
+            <a:spAutoFit/>
+          </a:bodyPr>
+          <a:lstStyle/>
+          <a:p>
+            <a:pPr algn="ctr"/>
+            <a:r>
+              <a:rPr lang="en-US" sz="1600" b="1" dirty="0">
+                <a:solidFill>
+                  <a:schemeClr val="accent5"/>
+                </a:solidFill>
+              </a:rPr>
+              <a:t>Reveals drivers of missingness</a:t>
+            </a:r>
+          </a:p>
+        </p:txBody>
+      </p:sp>
+      <p:cxnSp>
+        <p:nvCxnSpPr>
+          <p:cNvPr id="31" name="Straight Arrow Connector 30">
+            <a:extLst>
+              <a:ext uri="{FF2B5EF4-FFF2-40B4-BE49-F238E27FC236}">
+                <a16:creationId xmlns:a16="http://schemas.microsoft.com/office/drawing/2014/main" id="{9ADBBDFB-4E04-0CC9-4F94-A82269D13BAF}"/>
+              </a:ext>
+            </a:extLst>
+          </p:cNvPr>
+          <p:cNvCxnSpPr>
+            <a:cxnSpLocks/>
+          </p:cNvCxnSpPr>
+          <p:nvPr/>
+        </p:nvCxnSpPr>
+        <p:spPr>
+          <a:xfrm>
+            <a:off x="6820525" y="1645763"/>
+            <a:ext cx="0" cy="284527"/>
+          </a:xfrm>
+          <a:prstGeom prst="straightConnector1">
+            <a:avLst/>
+          </a:prstGeom>
+          <a:ln w="38100">
+            <a:solidFill>
+              <a:schemeClr val="accent5"/>
+            </a:solidFill>
+            <a:tailEnd type="none"/>
+          </a:ln>
+        </p:spPr>
+        <p:style>
+          <a:lnRef idx="2">
+            <a:schemeClr val="accent1"/>
+          </a:lnRef>
+          <a:fillRef idx="0">
+            <a:schemeClr val="accent1"/>
+          </a:fillRef>
+          <a:effectRef idx="1">
+            <a:schemeClr val="accent1"/>
+          </a:effectRef>
+          <a:fontRef idx="minor">
+            <a:schemeClr val="tx1"/>
+          </a:fontRef>
+        </p:style>
+      </p:cxnSp>
+      <p:sp>
+        <p:nvSpPr>
+          <p:cNvPr id="34" name="TextBox 33">
+            <a:extLst>
+              <a:ext uri="{FF2B5EF4-FFF2-40B4-BE49-F238E27FC236}">
+                <a16:creationId xmlns:a16="http://schemas.microsoft.com/office/drawing/2014/main" id="{156DCF24-5D18-DCDD-D3DD-DF7813577578}"/>
+              </a:ext>
+            </a:extLst>
+          </p:cNvPr>
+          <p:cNvSpPr txBox="1"/>
+          <p:nvPr/>
+        </p:nvSpPr>
+        <p:spPr>
+          <a:xfrm>
+            <a:off x="621200" y="7355202"/>
+            <a:ext cx="4275529" cy="338554"/>
+          </a:xfrm>
+          <a:prstGeom prst="rect">
+            <a:avLst/>
+          </a:prstGeom>
+          <a:noFill/>
+        </p:spPr>
+        <p:txBody>
+          <a:bodyPr wrap="none" rtlCol="0">
+            <a:spAutoFit/>
+          </a:bodyPr>
+          <a:lstStyle/>
+          <a:p>
+            <a:pPr algn="ctr"/>
+            <a:r>
+              <a:rPr lang="en-US" sz="1600" b="1" dirty="0">
+                <a:solidFill>
+                  <a:schemeClr val="accent5"/>
+                </a:solidFill>
+              </a:rPr>
+              <a:t>Only reveals that missing values are present</a:t>
+            </a:r>
+          </a:p>
+        </p:txBody>
+      </p:sp>
+      <p:sp>
+        <p:nvSpPr>
+          <p:cNvPr id="35" name="TextBox 34">
+            <a:extLst>
+              <a:ext uri="{FF2B5EF4-FFF2-40B4-BE49-F238E27FC236}">
+                <a16:creationId xmlns:a16="http://schemas.microsoft.com/office/drawing/2014/main" id="{F1BA2B56-1922-4A2F-5422-2A6EE1400751}"/>
+              </a:ext>
+            </a:extLst>
+          </p:cNvPr>
+          <p:cNvSpPr txBox="1"/>
+          <p:nvPr/>
+        </p:nvSpPr>
+        <p:spPr>
+          <a:xfrm>
+            <a:off x="5767523" y="7368844"/>
+            <a:ext cx="2132508" cy="338554"/>
+          </a:xfrm>
+          <a:prstGeom prst="rect">
+            <a:avLst/>
+          </a:prstGeom>
+          <a:noFill/>
+        </p:spPr>
+        <p:txBody>
+          <a:bodyPr wrap="none" rtlCol="0">
+            <a:spAutoFit/>
+          </a:bodyPr>
+          <a:lstStyle/>
+          <a:p>
+            <a:pPr algn="ctr"/>
+            <a:r>
+              <a:rPr lang="en-US" sz="1600" b="1" dirty="0">
+                <a:solidFill>
+                  <a:schemeClr val="accent5"/>
+                </a:solidFill>
+              </a:rPr>
+              <a:t>Missing Data Ignored</a:t>
+            </a:r>
+          </a:p>
+        </p:txBody>
+      </p:sp>
+      <p:grpSp>
+        <p:nvGrpSpPr>
+          <p:cNvPr id="38" name="Group 37">
+            <a:extLst>
+              <a:ext uri="{FF2B5EF4-FFF2-40B4-BE49-F238E27FC236}">
+                <a16:creationId xmlns:a16="http://schemas.microsoft.com/office/drawing/2014/main" id="{6D35226B-38B3-64D0-0FEC-F3D57238ECB4}"/>
+              </a:ext>
+            </a:extLst>
+          </p:cNvPr>
+          <p:cNvGrpSpPr/>
+          <p:nvPr/>
+        </p:nvGrpSpPr>
+        <p:grpSpPr>
+          <a:xfrm rot="10800000">
+            <a:off x="2343803" y="6994878"/>
+            <a:ext cx="830318" cy="284527"/>
+            <a:chOff x="6703102" y="1546236"/>
+            <a:chExt cx="539646" cy="284527"/>
+          </a:xfrm>
+        </p:grpSpPr>
+        <p:cxnSp>
+          <p:nvCxnSpPr>
+            <p:cNvPr id="36" name="Straight Connector 35">
+              <a:extLst>
+                <a:ext uri="{FF2B5EF4-FFF2-40B4-BE49-F238E27FC236}">
+                  <a16:creationId xmlns:a16="http://schemas.microsoft.com/office/drawing/2014/main" id="{72EF7BE5-C094-26EC-29D5-92B3B0BC3F65}"/>
+                </a:ext>
+              </a:extLst>
+            </p:cNvPr>
+            <p:cNvCxnSpPr/>
+            <p:nvPr/>
+          </p:nvCxnSpPr>
+          <p:spPr>
+            <a:xfrm>
+              <a:off x="6703102" y="1816308"/>
+              <a:ext cx="539646" cy="0"/>
+            </a:xfrm>
+            <a:prstGeom prst="line">
+              <a:avLst/>
+            </a:prstGeom>
+            <a:ln w="57150">
+              <a:solidFill>
+                <a:schemeClr val="accent5"/>
+              </a:solidFill>
+            </a:ln>
+          </p:spPr>
+          <p:style>
+            <a:lnRef idx="2">
+              <a:schemeClr val="accent1"/>
+            </a:lnRef>
+            <a:fillRef idx="0">
+              <a:schemeClr val="accent1"/>
+            </a:fillRef>
+            <a:effectRef idx="1">
+              <a:schemeClr val="accent1"/>
+            </a:effectRef>
+            <a:fontRef idx="minor">
+              <a:schemeClr val="tx1"/>
+            </a:fontRef>
+          </p:style>
+        </p:cxnSp>
+        <p:cxnSp>
+          <p:nvCxnSpPr>
+            <p:cNvPr id="37" name="Straight Arrow Connector 36">
+              <a:extLst>
+                <a:ext uri="{FF2B5EF4-FFF2-40B4-BE49-F238E27FC236}">
+                  <a16:creationId xmlns:a16="http://schemas.microsoft.com/office/drawing/2014/main" id="{AA8D9F07-E6B8-C6EE-339E-54276D6FC71F}"/>
+                </a:ext>
+              </a:extLst>
+            </p:cNvPr>
+            <p:cNvCxnSpPr>
+              <a:cxnSpLocks/>
+            </p:cNvCxnSpPr>
+            <p:nvPr/>
+          </p:nvCxnSpPr>
+          <p:spPr>
+            <a:xfrm>
+              <a:off x="6972925" y="1546236"/>
+              <a:ext cx="0" cy="284527"/>
+            </a:xfrm>
+            <a:prstGeom prst="straightConnector1">
+              <a:avLst/>
+            </a:prstGeom>
+            <a:ln w="38100">
+              <a:solidFill>
+                <a:schemeClr val="accent5"/>
+              </a:solidFill>
+              <a:tailEnd type="none"/>
+            </a:ln>
+          </p:spPr>
+          <p:style>
+            <a:lnRef idx="2">
+              <a:schemeClr val="accent1"/>
+            </a:lnRef>
+            <a:fillRef idx="0">
+              <a:schemeClr val="accent1"/>
+            </a:fillRef>
+            <a:effectRef idx="1">
+              <a:schemeClr val="accent1"/>
+            </a:effectRef>
+            <a:fontRef idx="minor">
+              <a:schemeClr val="tx1"/>
+            </a:fontRef>
+          </p:style>
+        </p:cxnSp>
+      </p:grpSp>
+      <p:grpSp>
+        <p:nvGrpSpPr>
+          <p:cNvPr id="39" name="Group 38">
+            <a:extLst>
+              <a:ext uri="{FF2B5EF4-FFF2-40B4-BE49-F238E27FC236}">
+                <a16:creationId xmlns:a16="http://schemas.microsoft.com/office/drawing/2014/main" id="{B33633E4-52A5-2CCB-5DEF-C2285E4C1479}"/>
+              </a:ext>
+            </a:extLst>
+          </p:cNvPr>
+          <p:cNvGrpSpPr/>
+          <p:nvPr/>
+        </p:nvGrpSpPr>
+        <p:grpSpPr>
+          <a:xfrm rot="10800000">
+            <a:off x="5906052" y="7003886"/>
+            <a:ext cx="1197548" cy="284527"/>
+            <a:chOff x="6332649" y="1546236"/>
+            <a:chExt cx="1197548" cy="284527"/>
+          </a:xfrm>
+        </p:grpSpPr>
+        <p:cxnSp>
+          <p:nvCxnSpPr>
+            <p:cNvPr id="40" name="Straight Connector 39">
+              <a:extLst>
+                <a:ext uri="{FF2B5EF4-FFF2-40B4-BE49-F238E27FC236}">
+                  <a16:creationId xmlns:a16="http://schemas.microsoft.com/office/drawing/2014/main" id="{362201CC-D883-0C08-5427-735DCC3C33DD}"/>
+                </a:ext>
+              </a:extLst>
+            </p:cNvPr>
+            <p:cNvCxnSpPr>
+              <a:cxnSpLocks/>
+            </p:cNvCxnSpPr>
+            <p:nvPr/>
+          </p:nvCxnSpPr>
+          <p:spPr>
+            <a:xfrm rot="10800000" flipH="1">
+              <a:off x="6332649" y="1816308"/>
+              <a:ext cx="1197548" cy="0"/>
+            </a:xfrm>
+            <a:prstGeom prst="line">
+              <a:avLst/>
+            </a:prstGeom>
+            <a:ln w="57150">
+              <a:solidFill>
+                <a:schemeClr val="accent5"/>
+              </a:solidFill>
+            </a:ln>
+          </p:spPr>
+          <p:style>
+            <a:lnRef idx="2">
+              <a:schemeClr val="accent1"/>
+            </a:lnRef>
+            <a:fillRef idx="0">
+              <a:schemeClr val="accent1"/>
+            </a:fillRef>
+            <a:effectRef idx="1">
+              <a:schemeClr val="accent1"/>
+            </a:effectRef>
+            <a:fontRef idx="minor">
+              <a:schemeClr val="tx1"/>
+            </a:fontRef>
+          </p:style>
+        </p:cxnSp>
+        <p:cxnSp>
+          <p:nvCxnSpPr>
+            <p:cNvPr id="41" name="Straight Arrow Connector 40">
+              <a:extLst>
+                <a:ext uri="{FF2B5EF4-FFF2-40B4-BE49-F238E27FC236}">
+                  <a16:creationId xmlns:a16="http://schemas.microsoft.com/office/drawing/2014/main" id="{906DF80F-EA7B-E7BC-0B36-00F4624AA7DD}"/>
+                </a:ext>
+              </a:extLst>
+            </p:cNvPr>
+            <p:cNvCxnSpPr>
+              <a:cxnSpLocks/>
+            </p:cNvCxnSpPr>
+            <p:nvPr/>
+          </p:nvCxnSpPr>
+          <p:spPr>
+            <a:xfrm>
+              <a:off x="6972925" y="1546236"/>
+              <a:ext cx="0" cy="284527"/>
+            </a:xfrm>
+            <a:prstGeom prst="straightConnector1">
+              <a:avLst/>
+            </a:prstGeom>
+            <a:ln w="38100">
+              <a:solidFill>
+                <a:schemeClr val="accent5"/>
+              </a:solidFill>
+              <a:tailEnd type="none"/>
+            </a:ln>
+          </p:spPr>
+          <p:style>
+            <a:lnRef idx="2">
+              <a:schemeClr val="accent1"/>
+            </a:lnRef>
+            <a:fillRef idx="0">
+              <a:schemeClr val="accent1"/>
+            </a:fillRef>
+            <a:effectRef idx="1">
+              <a:schemeClr val="accent1"/>
+            </a:effectRef>
+            <a:fontRef idx="minor">
+              <a:schemeClr val="tx1"/>
+            </a:fontRef>
+          </p:style>
+        </p:cxnSp>
+      </p:grpSp>
+    </p:spTree>
+    <p:extLst>
+      <p:ext uri="{BB962C8B-B14F-4D97-AF65-F5344CB8AC3E}">
+        <p14:creationId xmlns:p14="http://schemas.microsoft.com/office/powerpoint/2010/main" val="3610122936"/>
+      </p:ext>
+    </p:extLst>
+  </p:cSld>
+  <p:clrMapOvr>
+    <a:masterClrMapping/>
+  </p:clrMapOvr>
+</p:sld>
+</file>
+
 <file path=ppt/theme/theme1.xml><?xml version="1.0" encoding="utf-8"?>
 <a:theme xmlns:a="http://schemas.openxmlformats.org/drawingml/2006/main" name="Office Theme">
   <a:themeElements>

</xml_diff>